<commit_message>
working on heatmap and doc
</commit_message>
<xml_diff>
--- a/docs/manuscripts/euc manuscript/figs/fig_panels_120418.pptx
+++ b/docs/manuscripts/euc manuscript/figs/fig_panels_120418.pptx
@@ -5,11 +5,12 @@
     <p:sldMasterId id="2147483648" r:id="rId1"/>
   </p:sldMasterIdLst>
   <p:notesMasterIdLst>
-    <p:notesMasterId r:id="rId4"/>
+    <p:notesMasterId r:id="rId5"/>
   </p:notesMasterIdLst>
   <p:sldIdLst>
     <p:sldId id="257" r:id="rId2"/>
-    <p:sldId id="258" r:id="rId3"/>
+    <p:sldId id="259" r:id="rId3"/>
+    <p:sldId id="258" r:id="rId4"/>
   </p:sldIdLst>
   <p:sldSz cx="12192000" cy="6858000"/>
   <p:notesSz cx="6858000" cy="9144000"/>
@@ -655,6 +656,146 @@
           <a:bodyPr/>
           <a:lstStyle/>
           <a:p>
+            <a:pPr marL="0" marR="0" lvl="0" indent="0" algn="l" defTabSz="1280160" rtl="0" eaLnBrk="1" fontAlgn="auto" latinLnBrk="0" hangingPunct="1">
+              <a:lnSpc>
+                <a:spcPct val="100000"/>
+              </a:lnSpc>
+              <a:spcBef>
+                <a:spcPts val="0"/>
+              </a:spcBef>
+              <a:spcAft>
+                <a:spcPts val="0"/>
+              </a:spcAft>
+              <a:buClrTx/>
+              <a:buSzTx/>
+              <a:buFontTx/>
+              <a:buNone/>
+              <a:tabLst/>
+              <a:defRPr/>
+            </a:pPr>
+            <a:r>
+              <a:rPr lang="en-AU" b="1" dirty="0" smtClean="0"/>
+              <a:t>1.) Quantifying leaf proteins at the continental scale. </a:t>
+            </a:r>
+            <a:r>
+              <a:rPr lang="en-AU" dirty="0" smtClean="0"/>
+              <a:t>A total of 324 photosynthetically active Eucalypt leaf samples were collected from 32 species; four species were recorded at multiple location. For each species-location combination, three canopy leaves were collected from each of three individuals to make a total of nine samples. </a:t>
+            </a:r>
+          </a:p>
+          <a:p>
+            <a:endParaRPr lang="en-AU" dirty="0" smtClean="0"/>
+          </a:p>
+          <a:p>
+            <a:r>
+              <a:rPr lang="en-AU" dirty="0" smtClean="0"/>
+              <a:t>a.) Sampling locations (triangles) were located along three latitudinal bands, spanning broad gradients of rainfall and temperature. The resulting coverage of climate space represents of much of the vegetated area of the Australian continent;</a:t>
+            </a:r>
+          </a:p>
+          <a:p>
+            <a:endParaRPr lang="en-AU" dirty="0" smtClean="0"/>
+          </a:p>
+          <a:p>
+            <a:r>
+              <a:rPr lang="en-AU" dirty="0" smtClean="0"/>
+              <a:t>b.) Mean annual temperature (</a:t>
+            </a:r>
+            <a:r>
+              <a:rPr lang="en-AU" dirty="0" err="1" smtClean="0"/>
+              <a:t>oC</a:t>
+            </a:r>
+            <a:r>
+              <a:rPr lang="en-AU" dirty="0" smtClean="0"/>
+              <a:t>) and mean annual precipitation (mm, log scaled) of sampling sites (triangles) were distributed orthogonally with respect to one another (r = ); </a:t>
+            </a:r>
+            <a:endParaRPr lang="en-AU" dirty="0"/>
+          </a:p>
+        </p:txBody>
+      </p:sp>
+      <p:sp>
+        <p:nvSpPr>
+          <p:cNvPr id="4" name="Slide Number Placeholder 3"/>
+          <p:cNvSpPr>
+            <a:spLocks noGrp="1"/>
+          </p:cNvSpPr>
+          <p:nvPr>
+            <p:ph type="sldNum" sz="quarter" idx="10"/>
+          </p:nvPr>
+        </p:nvSpPr>
+        <p:spPr/>
+        <p:txBody>
+          <a:bodyPr/>
+          <a:lstStyle/>
+          <a:p>
+            <a:fld id="{C73DF9B0-E08B-4862-93DE-9A4C9A8C6C80}" type="slidenum">
+              <a:rPr lang="en-AU" smtClean="0"/>
+              <a:t>2</a:t>
+            </a:fld>
+            <a:endParaRPr lang="en-AU"/>
+          </a:p>
+        </p:txBody>
+      </p:sp>
+    </p:spTree>
+    <p:extLst>
+      <p:ext uri="{BB962C8B-B14F-4D97-AF65-F5344CB8AC3E}">
+        <p14:creationId xmlns:p14="http://schemas.microsoft.com/office/powerpoint/2010/main" val="1881050013"/>
+      </p:ext>
+    </p:extLst>
+  </p:cSld>
+  <p:clrMapOvr>
+    <a:masterClrMapping/>
+  </p:clrMapOvr>
+</p:notes>
+</file>
+
+<file path=ppt/notesSlides/notesSlide3.xml><?xml version="1.0" encoding="utf-8"?>
+<p:notes xmlns:a="http://schemas.openxmlformats.org/drawingml/2006/main" xmlns:r="http://schemas.openxmlformats.org/officeDocument/2006/relationships" xmlns:p="http://schemas.openxmlformats.org/presentationml/2006/main">
+  <p:cSld>
+    <p:spTree>
+      <p:nvGrpSpPr>
+        <p:cNvPr id="1" name=""/>
+        <p:cNvGrpSpPr/>
+        <p:nvPr/>
+      </p:nvGrpSpPr>
+      <p:grpSpPr>
+        <a:xfrm>
+          <a:off x="0" y="0"/>
+          <a:ext cx="0" cy="0"/>
+          <a:chOff x="0" y="0"/>
+          <a:chExt cx="0" cy="0"/>
+        </a:xfrm>
+      </p:grpSpPr>
+      <p:sp>
+        <p:nvSpPr>
+          <p:cNvPr id="2" name="Slide Image Placeholder 1"/>
+          <p:cNvSpPr>
+            <a:spLocks noGrp="1" noRot="1" noChangeAspect="1"/>
+          </p:cNvSpPr>
+          <p:nvPr>
+            <p:ph type="sldImg"/>
+          </p:nvPr>
+        </p:nvSpPr>
+        <p:spPr>
+          <a:xfrm>
+            <a:off x="685800" y="1143000"/>
+            <a:ext cx="5486400" cy="3086100"/>
+          </a:xfrm>
+        </p:spPr>
+      </p:sp>
+      <p:sp>
+        <p:nvSpPr>
+          <p:cNvPr id="3" name="Notes Placeholder 2"/>
+          <p:cNvSpPr>
+            <a:spLocks noGrp="1"/>
+          </p:cNvSpPr>
+          <p:nvPr>
+            <p:ph type="body" idx="1"/>
+          </p:nvPr>
+        </p:nvSpPr>
+        <p:spPr/>
+        <p:txBody>
+          <a:bodyPr/>
+          <a:lstStyle/>
+          <a:p>
             <a:r>
               <a:rPr lang="en-AU" sz="1680" b="1" kern="1200" dirty="0" smtClean="0">
                 <a:solidFill>
@@ -1359,7 +1500,7 @@
           <a:p>
             <a:fld id="{C73DF9B0-E08B-4862-93DE-9A4C9A8C6C80}" type="slidenum">
               <a:rPr lang="en-AU" smtClean="0"/>
-              <a:t>2</a:t>
+              <a:t>3</a:t>
             </a:fld>
             <a:endParaRPr lang="en-AU"/>
           </a:p>
@@ -4300,30 +4441,6 @@
           </a:prstGeom>
         </p:spPr>
       </p:pic>
-      <p:pic>
-        <p:nvPicPr>
-          <p:cNvPr id="36" name="Picture 35"/>
-          <p:cNvPicPr>
-            <a:picLocks noChangeAspect="1"/>
-          </p:cNvPicPr>
-          <p:nvPr/>
-        </p:nvPicPr>
-        <p:blipFill>
-          <a:blip r:embed="rId4"/>
-          <a:stretch>
-            <a:fillRect/>
-          </a:stretch>
-        </p:blipFill>
-        <p:spPr>
-          <a:xfrm>
-            <a:off x="3610977" y="2591917"/>
-            <a:ext cx="1142232" cy="871002"/>
-          </a:xfrm>
-          <a:prstGeom prst="rect">
-            <a:avLst/>
-          </a:prstGeom>
-        </p:spPr>
-      </p:pic>
       <p:grpSp>
         <p:nvGrpSpPr>
           <p:cNvPr id="8" name="Group 7"/>
@@ -4347,7 +4464,7 @@
             <p:nvPr/>
           </p:nvPicPr>
           <p:blipFill>
-            <a:blip r:embed="rId5" cstate="print">
+            <a:blip r:embed="rId4" cstate="print">
               <a:extLst>
                 <a:ext uri="{28A0092B-C50C-407E-A947-70E740481C1C}">
                   <a14:useLocalDpi xmlns:a14="http://schemas.microsoft.com/office/drawing/2010/main" val="0"/>
@@ -4436,7 +4553,7 @@
           <p:nvPr/>
         </p:nvPicPr>
         <p:blipFill>
-          <a:blip r:embed="rId6" cstate="print">
+          <a:blip r:embed="rId5" cstate="print">
             <a:extLst>
               <a:ext uri="{28A0092B-C50C-407E-A947-70E740481C1C}">
                 <a14:useLocalDpi xmlns:a14="http://schemas.microsoft.com/office/drawing/2010/main" val="0"/>
@@ -4471,8 +4588,8 @@
         </p:nvGrpSpPr>
         <p:grpSpPr>
           <a:xfrm>
-            <a:off x="4839102" y="2464822"/>
-            <a:ext cx="1361105" cy="1039301"/>
+            <a:off x="5312548" y="2606428"/>
+            <a:ext cx="2144325" cy="1637345"/>
             <a:chOff x="-3343354" y="1339480"/>
             <a:chExt cx="4852762" cy="3433097"/>
           </a:xfrm>
@@ -4492,7 +4609,7 @@
             <p:nvPr/>
           </p:nvPicPr>
           <p:blipFill>
-            <a:blip r:embed="rId7" cstate="print">
+            <a:blip r:embed="rId6" cstate="print">
               <a:extLst>
                 <a:ext uri="{28A0092B-C50C-407E-A947-70E740481C1C}">
                   <a14:useLocalDpi xmlns:a14="http://schemas.microsoft.com/office/drawing/2010/main" val="0"/>
@@ -4549,52 +4666,36 @@
           </p:txBody>
         </p:sp>
       </p:grpSp>
-      <p:sp>
-        <p:nvSpPr>
-          <p:cNvPr id="16" name="Rectangle 15"/>
-          <p:cNvSpPr/>
+      <p:pic>
+        <p:nvPicPr>
+          <p:cNvPr id="2" name="Picture 1"/>
+          <p:cNvPicPr>
+            <a:picLocks noChangeAspect="1"/>
+          </p:cNvPicPr>
           <p:nvPr/>
-        </p:nvSpPr>
+        </p:nvPicPr>
+        <p:blipFill>
+          <a:blip r:embed="rId7" cstate="print">
+            <a:extLst>
+              <a:ext uri="{28A0092B-C50C-407E-A947-70E740481C1C}">
+                <a14:useLocalDpi xmlns:a14="http://schemas.microsoft.com/office/drawing/2010/main" val="0"/>
+              </a:ext>
+            </a:extLst>
+          </a:blip>
+          <a:stretch>
+            <a:fillRect/>
+          </a:stretch>
+        </p:blipFill>
         <p:spPr>
           <a:xfrm>
-            <a:off x="6153120" y="2170786"/>
-            <a:ext cx="2425472" cy="1303826"/>
+            <a:off x="3580977" y="2497085"/>
+            <a:ext cx="1845871" cy="1677144"/>
           </a:xfrm>
           <a:prstGeom prst="rect">
             <a:avLst/>
           </a:prstGeom>
-          <a:solidFill>
-            <a:schemeClr val="accent1">
-              <a:lumMod val="20000"/>
-              <a:lumOff val="80000"/>
-            </a:schemeClr>
-          </a:solidFill>
         </p:spPr>
-        <p:style>
-          <a:lnRef idx="2">
-            <a:schemeClr val="accent1">
-              <a:shade val="50000"/>
-            </a:schemeClr>
-          </a:lnRef>
-          <a:fillRef idx="1">
-            <a:schemeClr val="accent1"/>
-          </a:fillRef>
-          <a:effectRef idx="0">
-            <a:schemeClr val="accent1"/>
-          </a:effectRef>
-          <a:fontRef idx="minor">
-            <a:schemeClr val="lt1"/>
-          </a:fontRef>
-        </p:style>
-        <p:txBody>
-          <a:bodyPr rtlCol="0" anchor="ctr"/>
-          <a:lstStyle/>
-          <a:p>
-            <a:pPr algn="ctr"/>
-            <a:endParaRPr lang="en-AU" sz="964"/>
-          </a:p>
-        </p:txBody>
-      </p:sp>
+      </p:pic>
     </p:spTree>
     <p:extLst>
       <p:ext uri="{BB962C8B-B14F-4D97-AF65-F5344CB8AC3E}">
@@ -4632,6 +4733,393 @@
           <a:chExt cx="0" cy="0"/>
         </a:xfrm>
       </p:grpSpPr>
+      <p:sp>
+        <p:nvSpPr>
+          <p:cNvPr id="20" name="TextBox 19">
+            <a:extLst>
+              <a:ext uri="{FF2B5EF4-FFF2-40B4-BE49-F238E27FC236}">
+                <a16:creationId xmlns:a16="http://schemas.microsoft.com/office/drawing/2014/main" id="{036694F8-822A-4EA9-A83F-BB11CF14A3AC}"/>
+              </a:ext>
+            </a:extLst>
+          </p:cNvPr>
+          <p:cNvSpPr txBox="1"/>
+          <p:nvPr/>
+        </p:nvSpPr>
+        <p:spPr>
+          <a:xfrm>
+            <a:off x="4859612" y="272868"/>
+            <a:ext cx="110094" cy="191271"/>
+          </a:xfrm>
+          <a:prstGeom prst="rect">
+            <a:avLst/>
+          </a:prstGeom>
+          <a:noFill/>
+        </p:spPr>
+        <p:txBody>
+          <a:bodyPr wrap="square" rtlCol="0">
+            <a:spAutoFit/>
+          </a:bodyPr>
+          <a:lstStyle/>
+          <a:p>
+            <a:r>
+              <a:rPr lang="en-AU" sz="643" dirty="0"/>
+              <a:t>a</a:t>
+            </a:r>
+          </a:p>
+        </p:txBody>
+      </p:sp>
+      <p:pic>
+        <p:nvPicPr>
+          <p:cNvPr id="35" name="Picture 34"/>
+          <p:cNvPicPr>
+            <a:picLocks noChangeAspect="1"/>
+          </p:cNvPicPr>
+          <p:nvPr/>
+        </p:nvPicPr>
+        <p:blipFill>
+          <a:blip r:embed="rId3" cstate="print">
+            <a:extLst>
+              <a:ext uri="{28A0092B-C50C-407E-A947-70E740481C1C}">
+                <a14:useLocalDpi xmlns:a14="http://schemas.microsoft.com/office/drawing/2010/main" val="0"/>
+              </a:ext>
+            </a:extLst>
+          </a:blip>
+          <a:stretch>
+            <a:fillRect/>
+          </a:stretch>
+        </p:blipFill>
+        <p:spPr>
+          <a:xfrm>
+            <a:off x="2787227" y="272868"/>
+            <a:ext cx="1368359" cy="1926302"/>
+          </a:xfrm>
+          <a:prstGeom prst="rect">
+            <a:avLst/>
+          </a:prstGeom>
+        </p:spPr>
+      </p:pic>
+      <p:grpSp>
+        <p:nvGrpSpPr>
+          <p:cNvPr id="8" name="Group 7"/>
+          <p:cNvGrpSpPr/>
+          <p:nvPr/>
+        </p:nvGrpSpPr>
+        <p:grpSpPr>
+          <a:xfrm>
+            <a:off x="2960603" y="2358307"/>
+            <a:ext cx="2430470" cy="2315121"/>
+            <a:chOff x="671824" y="1653267"/>
+            <a:chExt cx="6668639" cy="6199336"/>
+          </a:xfrm>
+        </p:grpSpPr>
+        <p:pic>
+          <p:nvPicPr>
+            <p:cNvPr id="9" name="Picture 8"/>
+            <p:cNvPicPr>
+              <a:picLocks noChangeAspect="1"/>
+            </p:cNvPicPr>
+            <p:nvPr/>
+          </p:nvPicPr>
+          <p:blipFill>
+            <a:blip r:embed="rId4" cstate="print">
+              <a:extLst>
+                <a:ext uri="{28A0092B-C50C-407E-A947-70E740481C1C}">
+                  <a14:useLocalDpi xmlns:a14="http://schemas.microsoft.com/office/drawing/2010/main" val="0"/>
+                </a:ext>
+              </a:extLst>
+            </a:blip>
+            <a:stretch>
+              <a:fillRect/>
+            </a:stretch>
+          </p:blipFill>
+          <p:spPr>
+            <a:xfrm>
+              <a:off x="671824" y="1653267"/>
+              <a:ext cx="6668639" cy="6199336"/>
+            </a:xfrm>
+            <a:prstGeom prst="rect">
+              <a:avLst/>
+            </a:prstGeom>
+          </p:spPr>
+        </p:pic>
+        <p:sp>
+          <p:nvSpPr>
+            <p:cNvPr id="10" name="TextBox 9"/>
+            <p:cNvSpPr txBox="1"/>
+            <p:nvPr/>
+          </p:nvSpPr>
+          <p:spPr>
+            <a:xfrm>
+              <a:off x="2713632" y="3962400"/>
+              <a:ext cx="1022034" cy="820248"/>
+            </a:xfrm>
+            <a:prstGeom prst="rect">
+              <a:avLst/>
+            </a:prstGeom>
+            <a:noFill/>
+          </p:spPr>
+          <p:txBody>
+            <a:bodyPr wrap="square" rtlCol="0">
+              <a:spAutoFit/>
+            </a:bodyPr>
+            <a:lstStyle/>
+            <a:p>
+              <a:r>
+                <a:rPr lang="en-AU" sz="402" dirty="0"/>
+                <a:t>64%</a:t>
+              </a:r>
+            </a:p>
+          </p:txBody>
+        </p:sp>
+        <p:sp>
+          <p:nvSpPr>
+            <p:cNvPr id="11" name="TextBox 10"/>
+            <p:cNvSpPr txBox="1"/>
+            <p:nvPr/>
+          </p:nvSpPr>
+          <p:spPr>
+            <a:xfrm>
+              <a:off x="2459942" y="3795264"/>
+              <a:ext cx="2199041" cy="585370"/>
+            </a:xfrm>
+            <a:prstGeom prst="rect">
+              <a:avLst/>
+            </a:prstGeom>
+            <a:noFill/>
+          </p:spPr>
+          <p:txBody>
+            <a:bodyPr wrap="square" rtlCol="0">
+              <a:spAutoFit/>
+            </a:bodyPr>
+            <a:lstStyle/>
+            <a:p>
+              <a:r>
+                <a:rPr lang="en-AU" sz="402" dirty="0"/>
+                <a:t>Photosynthesis</a:t>
+              </a:r>
+            </a:p>
+          </p:txBody>
+        </p:sp>
+      </p:grpSp>
+      <p:pic>
+        <p:nvPicPr>
+          <p:cNvPr id="12" name="Picture 11"/>
+          <p:cNvPicPr>
+            <a:picLocks noChangeAspect="1"/>
+          </p:cNvPicPr>
+          <p:nvPr/>
+        </p:nvPicPr>
+        <p:blipFill>
+          <a:blip r:embed="rId5" cstate="print">
+            <a:extLst>
+              <a:ext uri="{28A0092B-C50C-407E-A947-70E740481C1C}">
+                <a14:useLocalDpi xmlns:a14="http://schemas.microsoft.com/office/drawing/2010/main" val="0"/>
+              </a:ext>
+            </a:extLst>
+          </a:blip>
+          <a:stretch>
+            <a:fillRect/>
+          </a:stretch>
+        </p:blipFill>
+        <p:spPr>
+          <a:xfrm>
+            <a:off x="5483534" y="2268040"/>
+            <a:ext cx="2482613" cy="2517848"/>
+          </a:xfrm>
+          <a:prstGeom prst="rect">
+            <a:avLst/>
+          </a:prstGeom>
+        </p:spPr>
+      </p:pic>
+      <p:grpSp>
+        <p:nvGrpSpPr>
+          <p:cNvPr id="13" name="Group 12">
+            <a:extLst>
+              <a:ext uri="{FF2B5EF4-FFF2-40B4-BE49-F238E27FC236}">
+                <a16:creationId xmlns:a16="http://schemas.microsoft.com/office/drawing/2014/main" id="{C9FFF9FF-C604-459E-BA51-CAAD744824C9}"/>
+              </a:ext>
+            </a:extLst>
+          </p:cNvPr>
+          <p:cNvGrpSpPr/>
+          <p:nvPr/>
+        </p:nvGrpSpPr>
+        <p:grpSpPr>
+          <a:xfrm>
+            <a:off x="6153311" y="720962"/>
+            <a:ext cx="2144325" cy="1637345"/>
+            <a:chOff x="-3343354" y="1339480"/>
+            <a:chExt cx="4852762" cy="3433097"/>
+          </a:xfrm>
+        </p:grpSpPr>
+        <p:pic>
+          <p:nvPicPr>
+            <p:cNvPr id="14" name="Picture 13" descr="abundance_rank_90pc.png">
+              <a:extLst>
+                <a:ext uri="{FF2B5EF4-FFF2-40B4-BE49-F238E27FC236}">
+                  <a16:creationId xmlns:a16="http://schemas.microsoft.com/office/drawing/2014/main" id="{34BBFF6D-3CCF-4CB2-B743-963595FCD805}"/>
+                </a:ext>
+              </a:extLst>
+            </p:cNvPr>
+            <p:cNvPicPr>
+              <a:picLocks noChangeAspect="1"/>
+            </p:cNvPicPr>
+            <p:nvPr/>
+          </p:nvPicPr>
+          <p:blipFill>
+            <a:blip r:embed="rId6" cstate="print">
+              <a:extLst>
+                <a:ext uri="{28A0092B-C50C-407E-A947-70E740481C1C}">
+                  <a14:useLocalDpi xmlns:a14="http://schemas.microsoft.com/office/drawing/2010/main" val="0"/>
+                </a:ext>
+              </a:extLst>
+            </a:blip>
+            <a:stretch>
+              <a:fillRect/>
+            </a:stretch>
+          </p:blipFill>
+          <p:spPr>
+            <a:xfrm>
+              <a:off x="-3233402" y="1339480"/>
+              <a:ext cx="4438936" cy="2855383"/>
+            </a:xfrm>
+            <a:prstGeom prst="rect">
+              <a:avLst/>
+            </a:prstGeom>
+          </p:spPr>
+        </p:pic>
+        <p:sp>
+          <p:nvSpPr>
+            <p:cNvPr id="15" name="TextBox 14">
+              <a:extLst>
+                <a:ext uri="{FF2B5EF4-FFF2-40B4-BE49-F238E27FC236}">
+                  <a16:creationId xmlns:a16="http://schemas.microsoft.com/office/drawing/2014/main" id="{589E7152-499C-44E8-BA29-4777970B8AAA}"/>
+                </a:ext>
+              </a:extLst>
+            </p:cNvPr>
+            <p:cNvSpPr txBox="1"/>
+            <p:nvPr/>
+          </p:nvSpPr>
+          <p:spPr>
+            <a:xfrm>
+              <a:off x="-3343354" y="4253015"/>
+              <a:ext cx="4852762" cy="519562"/>
+            </a:xfrm>
+            <a:prstGeom prst="rect">
+              <a:avLst/>
+            </a:prstGeom>
+            <a:noFill/>
+          </p:spPr>
+          <p:txBody>
+            <a:bodyPr wrap="square" rtlCol="0">
+              <a:spAutoFit/>
+            </a:bodyPr>
+            <a:lstStyle/>
+            <a:p>
+              <a:r>
+                <a:rPr lang="en-US" sz="422" dirty="0"/>
+                <a:t>&lt;500 proteins account for &gt;90% total leaf protein</a:t>
+              </a:r>
+            </a:p>
+          </p:txBody>
+        </p:sp>
+      </p:grpSp>
+      <p:pic>
+        <p:nvPicPr>
+          <p:cNvPr id="2" name="Picture 1"/>
+          <p:cNvPicPr>
+            <a:picLocks noChangeAspect="1"/>
+          </p:cNvPicPr>
+          <p:nvPr/>
+        </p:nvPicPr>
+        <p:blipFill>
+          <a:blip r:embed="rId7" cstate="print">
+            <a:extLst>
+              <a:ext uri="{28A0092B-C50C-407E-A947-70E740481C1C}">
+                <a14:useLocalDpi xmlns:a14="http://schemas.microsoft.com/office/drawing/2010/main" val="0"/>
+              </a:ext>
+            </a:extLst>
+          </a:blip>
+          <a:stretch>
+            <a:fillRect/>
+          </a:stretch>
+        </p:blipFill>
+        <p:spPr>
+          <a:xfrm>
+            <a:off x="4468138" y="491874"/>
+            <a:ext cx="1845871" cy="1677144"/>
+          </a:xfrm>
+          <a:prstGeom prst="rect">
+            <a:avLst/>
+          </a:prstGeom>
+        </p:spPr>
+      </p:pic>
+    </p:spTree>
+    <p:extLst>
+      <p:ext uri="{BB962C8B-B14F-4D97-AF65-F5344CB8AC3E}">
+        <p14:creationId xmlns:p14="http://schemas.microsoft.com/office/powerpoint/2010/main" val="1829000260"/>
+      </p:ext>
+    </p:extLst>
+  </p:cSld>
+  <p:clrMapOvr>
+    <a:masterClrMapping/>
+  </p:clrMapOvr>
+  <p:timing>
+    <p:tnLst>
+      <p:par>
+        <p:cTn id="1" dur="indefinite" restart="never" nodeType="tmRoot"/>
+      </p:par>
+    </p:tnLst>
+  </p:timing>
+</p:sld>
+</file>
+
+<file path=ppt/slides/slide3.xml><?xml version="1.0" encoding="utf-8"?>
+<p:sld xmlns:a="http://schemas.openxmlformats.org/drawingml/2006/main" xmlns:r="http://schemas.openxmlformats.org/officeDocument/2006/relationships" xmlns:p="http://schemas.openxmlformats.org/presentationml/2006/main">
+  <p:cSld>
+    <p:spTree>
+      <p:nvGrpSpPr>
+        <p:cNvPr id="1" name=""/>
+        <p:cNvGrpSpPr/>
+        <p:nvPr/>
+      </p:nvGrpSpPr>
+      <p:grpSpPr>
+        <a:xfrm>
+          <a:off x="0" y="0"/>
+          <a:ext cx="0" cy="0"/>
+          <a:chOff x="0" y="0"/>
+          <a:chExt cx="0" cy="0"/>
+        </a:xfrm>
+      </p:grpSpPr>
+      <p:pic>
+        <p:nvPicPr>
+          <p:cNvPr id="6" name="Picture 5"/>
+          <p:cNvPicPr>
+            <a:picLocks noChangeAspect="1"/>
+          </p:cNvPicPr>
+          <p:nvPr/>
+        </p:nvPicPr>
+        <p:blipFill>
+          <a:blip r:embed="rId3">
+            <a:extLst>
+              <a:ext uri="{28A0092B-C50C-407E-A947-70E740481C1C}">
+                <a14:useLocalDpi xmlns:a14="http://schemas.microsoft.com/office/drawing/2010/main" val="0"/>
+              </a:ext>
+            </a:extLst>
+          </a:blip>
+          <a:stretch>
+            <a:fillRect/>
+          </a:stretch>
+        </p:blipFill>
+        <p:spPr>
+          <a:xfrm>
+            <a:off x="3672229" y="254642"/>
+            <a:ext cx="3418734" cy="3296636"/>
+          </a:xfrm>
+          <a:prstGeom prst="rect">
+            <a:avLst/>
+          </a:prstGeom>
+        </p:spPr>
+      </p:pic>
       <p:grpSp>
         <p:nvGrpSpPr>
           <p:cNvPr id="52" name="Group 51"/>
@@ -4655,7 +5143,7 @@
             <p:nvPr/>
           </p:nvPicPr>
           <p:blipFill>
-            <a:blip r:embed="rId3" cstate="print">
+            <a:blip r:embed="rId4" cstate="print">
               <a:extLst>
                 <a:ext uri="{28A0092B-C50C-407E-A947-70E740481C1C}">
                   <a14:useLocalDpi xmlns:a14="http://schemas.microsoft.com/office/drawing/2010/main" val="0"/>
@@ -4685,7 +5173,7 @@
             <p:nvPr/>
           </p:nvPicPr>
           <p:blipFill>
-            <a:blip r:embed="rId4" cstate="print">
+            <a:blip r:embed="rId5" cstate="print">
               <a:extLst>
                 <a:ext uri="{28A0092B-C50C-407E-A947-70E740481C1C}">
                   <a14:useLocalDpi xmlns:a14="http://schemas.microsoft.com/office/drawing/2010/main" val="0"/>
@@ -4715,7 +5203,7 @@
             <p:nvPr/>
           </p:nvPicPr>
           <p:blipFill>
-            <a:blip r:embed="rId5" cstate="print">
+            <a:blip r:embed="rId6" cstate="print">
               <a:extLst>
                 <a:ext uri="{28A0092B-C50C-407E-A947-70E740481C1C}">
                   <a14:useLocalDpi xmlns:a14="http://schemas.microsoft.com/office/drawing/2010/main" val="0"/>
@@ -4745,7 +5233,7 @@
             <p:nvPr/>
           </p:nvPicPr>
           <p:blipFill>
-            <a:blip r:embed="rId6" cstate="print">
+            <a:blip r:embed="rId7" cstate="print">
               <a:extLst>
                 <a:ext uri="{28A0092B-C50C-407E-A947-70E740481C1C}">
                   <a14:useLocalDpi xmlns:a14="http://schemas.microsoft.com/office/drawing/2010/main" val="0"/>
@@ -4775,7 +5263,7 @@
             <p:nvPr/>
           </p:nvPicPr>
           <p:blipFill>
-            <a:blip r:embed="rId7" cstate="print">
+            <a:blip r:embed="rId8" cstate="print">
               <a:extLst>
                 <a:ext uri="{28A0092B-C50C-407E-A947-70E740481C1C}">
                   <a14:useLocalDpi xmlns:a14="http://schemas.microsoft.com/office/drawing/2010/main" val="0"/>
@@ -4805,7 +5293,7 @@
             <p:nvPr/>
           </p:nvPicPr>
           <p:blipFill>
-            <a:blip r:embed="rId8" cstate="print">
+            <a:blip r:embed="rId9" cstate="print">
               <a:extLst>
                 <a:ext uri="{28A0092B-C50C-407E-A947-70E740481C1C}">
                   <a14:useLocalDpi xmlns:a14="http://schemas.microsoft.com/office/drawing/2010/main" val="0"/>
@@ -5065,7 +5553,7 @@
             <p:nvPr/>
           </p:nvPicPr>
           <p:blipFill>
-            <a:blip r:embed="rId9" cstate="print">
+            <a:blip r:embed="rId10" cstate="print">
               <a:extLst>
                 <a:ext uri="{28A0092B-C50C-407E-A947-70E740481C1C}">
                   <a14:useLocalDpi xmlns:a14="http://schemas.microsoft.com/office/drawing/2010/main" val="0"/>
@@ -5095,7 +5583,7 @@
             <p:nvPr/>
           </p:nvPicPr>
           <p:blipFill>
-            <a:blip r:embed="rId10" cstate="print">
+            <a:blip r:embed="rId11" cstate="print">
               <a:extLst>
                 <a:ext uri="{28A0092B-C50C-407E-A947-70E740481C1C}">
                   <a14:useLocalDpi xmlns:a14="http://schemas.microsoft.com/office/drawing/2010/main" val="0"/>
@@ -5125,7 +5613,7 @@
             <p:nvPr/>
           </p:nvPicPr>
           <p:blipFill>
-            <a:blip r:embed="rId11" cstate="print">
+            <a:blip r:embed="rId12" cstate="print">
               <a:extLst>
                 <a:ext uri="{28A0092B-C50C-407E-A947-70E740481C1C}">
                   <a14:useLocalDpi xmlns:a14="http://schemas.microsoft.com/office/drawing/2010/main" val="0"/>
@@ -5155,7 +5643,7 @@
             <p:nvPr/>
           </p:nvPicPr>
           <p:blipFill>
-            <a:blip r:embed="rId12" cstate="print">
+            <a:blip r:embed="rId13" cstate="print">
               <a:extLst>
                 <a:ext uri="{28A0092B-C50C-407E-A947-70E740481C1C}">
                   <a14:useLocalDpi xmlns:a14="http://schemas.microsoft.com/office/drawing/2010/main" val="0"/>
@@ -5306,7 +5794,7 @@
           <p:nvPr/>
         </p:nvPicPr>
         <p:blipFill>
-          <a:blip r:embed="rId13"/>
+          <a:blip r:embed="rId14"/>
           <a:stretch>
             <a:fillRect/>
           </a:stretch>
@@ -5356,7 +5844,7 @@
             <p:nvPr/>
           </p:nvPicPr>
           <p:blipFill>
-            <a:blip r:embed="rId14"/>
+            <a:blip r:embed="rId15"/>
             <a:stretch>
               <a:fillRect/>
             </a:stretch>
@@ -5416,7 +5904,7 @@
           <p:nvPr/>
         </p:nvPicPr>
         <p:blipFill>
-          <a:blip r:embed="rId15"/>
+          <a:blip r:embed="rId16"/>
           <a:stretch>
             <a:fillRect/>
           </a:stretch>
@@ -5478,36 +5966,6 @@
           </a:p>
         </p:txBody>
       </p:sp>
-      <p:pic>
-        <p:nvPicPr>
-          <p:cNvPr id="5" name="Picture 4"/>
-          <p:cNvPicPr>
-            <a:picLocks noChangeAspect="1"/>
-          </p:cNvPicPr>
-          <p:nvPr/>
-        </p:nvPicPr>
-        <p:blipFill>
-          <a:blip r:embed="rId16" cstate="print">
-            <a:extLst>
-              <a:ext uri="{28A0092B-C50C-407E-A947-70E740481C1C}">
-                <a14:useLocalDpi xmlns:a14="http://schemas.microsoft.com/office/drawing/2010/main" val="0"/>
-              </a:ext>
-            </a:extLst>
-          </a:blip>
-          <a:stretch>
-            <a:fillRect/>
-          </a:stretch>
-        </p:blipFill>
-        <p:spPr>
-          <a:xfrm>
-            <a:off x="3704189" y="598141"/>
-            <a:ext cx="3006667" cy="2899286"/>
-          </a:xfrm>
-          <a:prstGeom prst="rect">
-            <a:avLst/>
-          </a:prstGeom>
-        </p:spPr>
-      </p:pic>
       <p:cxnSp>
         <p:nvCxnSpPr>
           <p:cNvPr id="7" name="Straight Connector 6"/>
@@ -5516,8 +5974,8 @@
         </p:nvCxnSpPr>
         <p:spPr>
           <a:xfrm flipV="1">
-            <a:off x="4467225" y="750094"/>
-            <a:ext cx="1828742" cy="1832797"/>
+            <a:off x="4288779" y="380326"/>
+            <a:ext cx="2328206" cy="2479189"/>
           </a:xfrm>
           <a:prstGeom prst="line">
             <a:avLst/>

</xml_diff>

<commit_message>
working on a results markdown doc
</commit_message>
<xml_diff>
--- a/docs/manuscripts/euc manuscript/figs/fig_panels_120418.pptx
+++ b/docs/manuscripts/euc manuscript/figs/fig_panels_120418.pptx
@@ -199,7 +199,7 @@
           <a:p>
             <a:fld id="{46CB1FCB-FFF7-4A61-A5C6-C50455374D1F}" type="datetimeFigureOut">
               <a:rPr lang="en-AU" smtClean="0"/>
-              <a:t>12/04/2018</a:t>
+              <a:t>23/04/2018</a:t>
             </a:fld>
             <a:endParaRPr lang="en-AU"/>
           </a:p>
@@ -1650,7 +1650,7 @@
           <a:p>
             <a:fld id="{D0D04FFC-C665-4B75-ABA2-871BBC76FE3C}" type="datetimeFigureOut">
               <a:rPr lang="en-AU" smtClean="0"/>
-              <a:t>12/04/2018</a:t>
+              <a:t>23/04/2018</a:t>
             </a:fld>
             <a:endParaRPr lang="en-AU"/>
           </a:p>
@@ -1820,7 +1820,7 @@
           <a:p>
             <a:fld id="{D0D04FFC-C665-4B75-ABA2-871BBC76FE3C}" type="datetimeFigureOut">
               <a:rPr lang="en-AU" smtClean="0"/>
-              <a:t>12/04/2018</a:t>
+              <a:t>23/04/2018</a:t>
             </a:fld>
             <a:endParaRPr lang="en-AU"/>
           </a:p>
@@ -2000,7 +2000,7 @@
           <a:p>
             <a:fld id="{D0D04FFC-C665-4B75-ABA2-871BBC76FE3C}" type="datetimeFigureOut">
               <a:rPr lang="en-AU" smtClean="0"/>
-              <a:t>12/04/2018</a:t>
+              <a:t>23/04/2018</a:t>
             </a:fld>
             <a:endParaRPr lang="en-AU"/>
           </a:p>
@@ -2170,7 +2170,7 @@
           <a:p>
             <a:fld id="{D0D04FFC-C665-4B75-ABA2-871BBC76FE3C}" type="datetimeFigureOut">
               <a:rPr lang="en-AU" smtClean="0"/>
-              <a:t>12/04/2018</a:t>
+              <a:t>23/04/2018</a:t>
             </a:fld>
             <a:endParaRPr lang="en-AU"/>
           </a:p>
@@ -2416,7 +2416,7 @@
           <a:p>
             <a:fld id="{D0D04FFC-C665-4B75-ABA2-871BBC76FE3C}" type="datetimeFigureOut">
               <a:rPr lang="en-AU" smtClean="0"/>
-              <a:t>12/04/2018</a:t>
+              <a:t>23/04/2018</a:t>
             </a:fld>
             <a:endParaRPr lang="en-AU"/>
           </a:p>
@@ -2648,7 +2648,7 @@
           <a:p>
             <a:fld id="{D0D04FFC-C665-4B75-ABA2-871BBC76FE3C}" type="datetimeFigureOut">
               <a:rPr lang="en-AU" smtClean="0"/>
-              <a:t>12/04/2018</a:t>
+              <a:t>23/04/2018</a:t>
             </a:fld>
             <a:endParaRPr lang="en-AU"/>
           </a:p>
@@ -3015,7 +3015,7 @@
           <a:p>
             <a:fld id="{D0D04FFC-C665-4B75-ABA2-871BBC76FE3C}" type="datetimeFigureOut">
               <a:rPr lang="en-AU" smtClean="0"/>
-              <a:t>12/04/2018</a:t>
+              <a:t>23/04/2018</a:t>
             </a:fld>
             <a:endParaRPr lang="en-AU"/>
           </a:p>
@@ -3133,7 +3133,7 @@
           <a:p>
             <a:fld id="{D0D04FFC-C665-4B75-ABA2-871BBC76FE3C}" type="datetimeFigureOut">
               <a:rPr lang="en-AU" smtClean="0"/>
-              <a:t>12/04/2018</a:t>
+              <a:t>23/04/2018</a:t>
             </a:fld>
             <a:endParaRPr lang="en-AU"/>
           </a:p>
@@ -3228,7 +3228,7 @@
           <a:p>
             <a:fld id="{D0D04FFC-C665-4B75-ABA2-871BBC76FE3C}" type="datetimeFigureOut">
               <a:rPr lang="en-AU" smtClean="0"/>
-              <a:t>12/04/2018</a:t>
+              <a:t>23/04/2018</a:t>
             </a:fld>
             <a:endParaRPr lang="en-AU"/>
           </a:p>
@@ -3505,7 +3505,7 @@
           <a:p>
             <a:fld id="{D0D04FFC-C665-4B75-ABA2-871BBC76FE3C}" type="datetimeFigureOut">
               <a:rPr lang="en-AU" smtClean="0"/>
-              <a:t>12/04/2018</a:t>
+              <a:t>23/04/2018</a:t>
             </a:fld>
             <a:endParaRPr lang="en-AU"/>
           </a:p>
@@ -3758,7 +3758,7 @@
           <a:p>
             <a:fld id="{D0D04FFC-C665-4B75-ABA2-871BBC76FE3C}" type="datetimeFigureOut">
               <a:rPr lang="en-AU" smtClean="0"/>
-              <a:t>12/04/2018</a:t>
+              <a:t>23/04/2018</a:t>
             </a:fld>
             <a:endParaRPr lang="en-AU"/>
           </a:p>
@@ -3971,7 +3971,7 @@
           <a:p>
             <a:fld id="{D0D04FFC-C665-4B75-ABA2-871BBC76FE3C}" type="datetimeFigureOut">
               <a:rPr lang="en-AU" smtClean="0"/>
-              <a:t>12/04/2018</a:t>
+              <a:t>23/04/2018</a:t>
             </a:fld>
             <a:endParaRPr lang="en-AU"/>
           </a:p>
@@ -5120,381 +5120,366 @@
           </a:prstGeom>
         </p:spPr>
       </p:pic>
-      <p:grpSp>
-        <p:nvGrpSpPr>
-          <p:cNvPr id="52" name="Group 51"/>
-          <p:cNvGrpSpPr/>
+      <p:pic>
+        <p:nvPicPr>
+          <p:cNvPr id="55" name="Picture 54"/>
+          <p:cNvPicPr>
+            <a:picLocks noChangeAspect="1"/>
+          </p:cNvPicPr>
           <p:nvPr/>
-        </p:nvGrpSpPr>
-        <p:grpSpPr>
+        </p:nvPicPr>
+        <p:blipFill>
+          <a:blip r:embed="rId4" cstate="print">
+            <a:extLst>
+              <a:ext uri="{28A0092B-C50C-407E-A947-70E740481C1C}">
+                <a14:useLocalDpi xmlns:a14="http://schemas.microsoft.com/office/drawing/2010/main" val="0"/>
+              </a:ext>
+            </a:extLst>
+          </a:blip>
+          <a:stretch>
+            <a:fillRect/>
+          </a:stretch>
+        </p:blipFill>
+        <p:spPr>
           <a:xfrm>
-            <a:off x="3698645" y="3577279"/>
-            <a:ext cx="2729563" cy="1739206"/>
-            <a:chOff x="91676" y="8847134"/>
-            <a:chExt cx="5095184" cy="3246518"/>
+            <a:off x="3698645" y="3661838"/>
+            <a:ext cx="909195" cy="804633"/>
           </a:xfrm>
-        </p:grpSpPr>
-        <p:pic>
-          <p:nvPicPr>
-            <p:cNvPr id="55" name="Picture 54"/>
-            <p:cNvPicPr>
-              <a:picLocks noChangeAspect="1"/>
-            </p:cNvPicPr>
-            <p:nvPr/>
-          </p:nvPicPr>
-          <p:blipFill>
-            <a:blip r:embed="rId4" cstate="print">
-              <a:extLst>
-                <a:ext uri="{28A0092B-C50C-407E-A947-70E740481C1C}">
-                  <a14:useLocalDpi xmlns:a14="http://schemas.microsoft.com/office/drawing/2010/main" val="0"/>
-                </a:ext>
-              </a:extLst>
-            </a:blip>
-            <a:stretch>
-              <a:fillRect/>
-            </a:stretch>
-          </p:blipFill>
-          <p:spPr>
-            <a:xfrm>
-              <a:off x="91676" y="9004978"/>
-              <a:ext cx="1697164" cy="1501981"/>
-            </a:xfrm>
-            <a:prstGeom prst="rect">
-              <a:avLst/>
-            </a:prstGeom>
-          </p:spPr>
-        </p:pic>
-        <p:pic>
-          <p:nvPicPr>
-            <p:cNvPr id="56" name="Picture 55"/>
-            <p:cNvPicPr>
-              <a:picLocks noChangeAspect="1"/>
-            </p:cNvPicPr>
-            <p:nvPr/>
-          </p:nvPicPr>
-          <p:blipFill>
-            <a:blip r:embed="rId5" cstate="print">
-              <a:extLst>
-                <a:ext uri="{28A0092B-C50C-407E-A947-70E740481C1C}">
-                  <a14:useLocalDpi xmlns:a14="http://schemas.microsoft.com/office/drawing/2010/main" val="0"/>
-                </a:ext>
-              </a:extLst>
-            </a:blip>
-            <a:stretch>
-              <a:fillRect/>
-            </a:stretch>
-          </p:blipFill>
-          <p:spPr>
-            <a:xfrm>
-              <a:off x="187274" y="10565733"/>
-              <a:ext cx="1697164" cy="1501981"/>
-            </a:xfrm>
-            <a:prstGeom prst="rect">
-              <a:avLst/>
-            </a:prstGeom>
-          </p:spPr>
-        </p:pic>
-        <p:pic>
-          <p:nvPicPr>
-            <p:cNvPr id="59" name="Picture 58"/>
-            <p:cNvPicPr>
-              <a:picLocks noChangeAspect="1"/>
-            </p:cNvPicPr>
-            <p:nvPr/>
-          </p:nvPicPr>
-          <p:blipFill>
-            <a:blip r:embed="rId6" cstate="print">
-              <a:extLst>
-                <a:ext uri="{28A0092B-C50C-407E-A947-70E740481C1C}">
-                  <a14:useLocalDpi xmlns:a14="http://schemas.microsoft.com/office/drawing/2010/main" val="0"/>
-                </a:ext>
-              </a:extLst>
-            </a:blip>
-            <a:stretch>
-              <a:fillRect/>
-            </a:stretch>
-          </p:blipFill>
-          <p:spPr>
-            <a:xfrm>
-              <a:off x="1772492" y="9004978"/>
-              <a:ext cx="1697164" cy="1501981"/>
-            </a:xfrm>
-            <a:prstGeom prst="rect">
-              <a:avLst/>
-            </a:prstGeom>
-          </p:spPr>
-        </p:pic>
-        <p:pic>
-          <p:nvPicPr>
-            <p:cNvPr id="60" name="Picture 59"/>
-            <p:cNvPicPr>
-              <a:picLocks noChangeAspect="1"/>
-            </p:cNvPicPr>
-            <p:nvPr/>
-          </p:nvPicPr>
-          <p:blipFill>
-            <a:blip r:embed="rId7" cstate="print">
-              <a:extLst>
-                <a:ext uri="{28A0092B-C50C-407E-A947-70E740481C1C}">
-                  <a14:useLocalDpi xmlns:a14="http://schemas.microsoft.com/office/drawing/2010/main" val="0"/>
-                </a:ext>
-              </a:extLst>
-            </a:blip>
-            <a:stretch>
-              <a:fillRect/>
-            </a:stretch>
-          </p:blipFill>
-          <p:spPr>
-            <a:xfrm>
-              <a:off x="1868090" y="10565328"/>
-              <a:ext cx="1697164" cy="1501981"/>
-            </a:xfrm>
-            <a:prstGeom prst="rect">
-              <a:avLst/>
-            </a:prstGeom>
-          </p:spPr>
-        </p:pic>
-        <p:pic>
-          <p:nvPicPr>
-            <p:cNvPr id="61" name="Picture 60"/>
-            <p:cNvPicPr>
-              <a:picLocks noChangeAspect="1"/>
-            </p:cNvPicPr>
-            <p:nvPr/>
-          </p:nvPicPr>
-          <p:blipFill>
-            <a:blip r:embed="rId8" cstate="print">
-              <a:extLst>
-                <a:ext uri="{28A0092B-C50C-407E-A947-70E740481C1C}">
-                  <a14:useLocalDpi xmlns:a14="http://schemas.microsoft.com/office/drawing/2010/main" val="0"/>
-                </a:ext>
-              </a:extLst>
-            </a:blip>
-            <a:stretch>
-              <a:fillRect/>
-            </a:stretch>
-          </p:blipFill>
-          <p:spPr>
-            <a:xfrm>
-              <a:off x="3418162" y="9004572"/>
-              <a:ext cx="1697164" cy="1501981"/>
-            </a:xfrm>
-            <a:prstGeom prst="rect">
-              <a:avLst/>
-            </a:prstGeom>
-          </p:spPr>
-        </p:pic>
-        <p:pic>
-          <p:nvPicPr>
-            <p:cNvPr id="62" name="Picture 61"/>
-            <p:cNvPicPr>
-              <a:picLocks noChangeAspect="1"/>
-            </p:cNvPicPr>
-            <p:nvPr/>
-          </p:nvPicPr>
-          <p:blipFill>
-            <a:blip r:embed="rId9" cstate="print">
-              <a:extLst>
-                <a:ext uri="{28A0092B-C50C-407E-A947-70E740481C1C}">
-                  <a14:useLocalDpi xmlns:a14="http://schemas.microsoft.com/office/drawing/2010/main" val="0"/>
-                </a:ext>
-              </a:extLst>
-            </a:blip>
-            <a:stretch>
-              <a:fillRect/>
-            </a:stretch>
-          </p:blipFill>
-          <p:spPr>
-            <a:xfrm>
-              <a:off x="3489696" y="10591671"/>
-              <a:ext cx="1697164" cy="1501981"/>
-            </a:xfrm>
-            <a:prstGeom prst="rect">
-              <a:avLst/>
-            </a:prstGeom>
-          </p:spPr>
-        </p:pic>
-        <p:sp>
-          <p:nvSpPr>
-            <p:cNvPr id="67" name="TextBox 66"/>
-            <p:cNvSpPr txBox="1"/>
-            <p:nvPr/>
-          </p:nvSpPr>
-          <p:spPr>
-            <a:xfrm>
-              <a:off x="311683" y="8847134"/>
-              <a:ext cx="133474" cy="341598"/>
-            </a:xfrm>
-            <a:prstGeom prst="rect">
-              <a:avLst/>
-            </a:prstGeom>
-            <a:noFill/>
-          </p:spPr>
-          <p:txBody>
-            <a:bodyPr wrap="square" rtlCol="0">
-              <a:spAutoFit/>
-            </a:bodyPr>
-            <a:lstStyle/>
-            <a:p>
-              <a:r>
-                <a:rPr lang="en-AU" sz="589" dirty="0" err="1"/>
-                <a:t>i</a:t>
-              </a:r>
-              <a:endParaRPr lang="en-AU" sz="643" dirty="0"/>
-            </a:p>
-          </p:txBody>
-        </p:sp>
-        <p:sp>
-          <p:nvSpPr>
-            <p:cNvPr id="68" name="TextBox 67"/>
-            <p:cNvSpPr txBox="1"/>
-            <p:nvPr/>
-          </p:nvSpPr>
-          <p:spPr>
-            <a:xfrm>
-              <a:off x="2017932" y="8847134"/>
-              <a:ext cx="467156" cy="341598"/>
-            </a:xfrm>
-            <a:prstGeom prst="rect">
-              <a:avLst/>
-            </a:prstGeom>
-            <a:noFill/>
-          </p:spPr>
-          <p:txBody>
-            <a:bodyPr wrap="square" rtlCol="0">
-              <a:spAutoFit/>
-            </a:bodyPr>
-            <a:lstStyle/>
-            <a:p>
-              <a:r>
-                <a:rPr lang="en-AU" sz="589" dirty="0"/>
-                <a:t>iii</a:t>
-              </a:r>
-              <a:endParaRPr lang="en-AU" sz="643" dirty="0"/>
-            </a:p>
-          </p:txBody>
-        </p:sp>
-        <p:sp>
-          <p:nvSpPr>
-            <p:cNvPr id="69" name="TextBox 68"/>
-            <p:cNvSpPr txBox="1"/>
-            <p:nvPr/>
-          </p:nvSpPr>
-          <p:spPr>
-            <a:xfrm>
-              <a:off x="3689749" y="8847134"/>
-              <a:ext cx="368112" cy="341598"/>
-            </a:xfrm>
-            <a:prstGeom prst="rect">
-              <a:avLst/>
-            </a:prstGeom>
-            <a:noFill/>
-          </p:spPr>
-          <p:txBody>
-            <a:bodyPr wrap="square" rtlCol="0">
-              <a:spAutoFit/>
-            </a:bodyPr>
-            <a:lstStyle/>
-            <a:p>
-              <a:r>
-                <a:rPr lang="en-AU" sz="589" dirty="0"/>
-                <a:t>v</a:t>
-              </a:r>
-              <a:endParaRPr lang="en-AU" sz="643" dirty="0"/>
-            </a:p>
-          </p:txBody>
-        </p:sp>
-        <p:sp>
-          <p:nvSpPr>
-            <p:cNvPr id="70" name="TextBox 69"/>
-            <p:cNvSpPr txBox="1"/>
-            <p:nvPr/>
-          </p:nvSpPr>
-          <p:spPr>
-            <a:xfrm>
-              <a:off x="285154" y="10360288"/>
-              <a:ext cx="277810" cy="510841"/>
-            </a:xfrm>
-            <a:prstGeom prst="rect">
-              <a:avLst/>
-            </a:prstGeom>
-            <a:noFill/>
-          </p:spPr>
-          <p:txBody>
-            <a:bodyPr wrap="square" rtlCol="0">
-              <a:spAutoFit/>
-            </a:bodyPr>
-            <a:lstStyle/>
-            <a:p>
-              <a:r>
-                <a:rPr lang="en-AU" sz="589" dirty="0"/>
-                <a:t>ii</a:t>
-              </a:r>
-              <a:endParaRPr lang="en-AU" sz="643" dirty="0"/>
-            </a:p>
-          </p:txBody>
-        </p:sp>
-        <p:sp>
-          <p:nvSpPr>
-            <p:cNvPr id="71" name="TextBox 70"/>
-            <p:cNvSpPr txBox="1"/>
-            <p:nvPr/>
-          </p:nvSpPr>
-          <p:spPr>
-            <a:xfrm>
-              <a:off x="1958701" y="10360288"/>
-              <a:ext cx="325521" cy="510841"/>
-            </a:xfrm>
-            <a:prstGeom prst="rect">
-              <a:avLst/>
-            </a:prstGeom>
-            <a:noFill/>
-          </p:spPr>
-          <p:txBody>
-            <a:bodyPr wrap="square" rtlCol="0">
-              <a:spAutoFit/>
-            </a:bodyPr>
-            <a:lstStyle/>
-            <a:p>
-              <a:r>
-                <a:rPr lang="en-AU" sz="589" dirty="0"/>
-                <a:t>iv</a:t>
-              </a:r>
-              <a:endParaRPr lang="en-AU" sz="643" dirty="0"/>
-            </a:p>
-          </p:txBody>
-        </p:sp>
-        <p:sp>
-          <p:nvSpPr>
-            <p:cNvPr id="72" name="TextBox 71"/>
-            <p:cNvSpPr txBox="1"/>
-            <p:nvPr/>
-          </p:nvSpPr>
-          <p:spPr>
-            <a:xfrm>
-              <a:off x="3656959" y="10360288"/>
-              <a:ext cx="300810" cy="510841"/>
-            </a:xfrm>
-            <a:prstGeom prst="rect">
-              <a:avLst/>
-            </a:prstGeom>
-            <a:noFill/>
-          </p:spPr>
-          <p:txBody>
-            <a:bodyPr wrap="square" rtlCol="0">
-              <a:spAutoFit/>
-            </a:bodyPr>
-            <a:lstStyle/>
-            <a:p>
-              <a:r>
-                <a:rPr lang="en-AU" sz="589" dirty="0"/>
-                <a:t>vi</a:t>
-              </a:r>
-              <a:endParaRPr lang="en-AU" sz="643" dirty="0"/>
-            </a:p>
-          </p:txBody>
-        </p:sp>
-      </p:grpSp>
+          <a:prstGeom prst="rect">
+            <a:avLst/>
+          </a:prstGeom>
+        </p:spPr>
+      </p:pic>
+      <p:pic>
+        <p:nvPicPr>
+          <p:cNvPr id="56" name="Picture 55"/>
+          <p:cNvPicPr>
+            <a:picLocks noChangeAspect="1"/>
+          </p:cNvPicPr>
+          <p:nvPr/>
+        </p:nvPicPr>
+        <p:blipFill>
+          <a:blip r:embed="rId5" cstate="print">
+            <a:extLst>
+              <a:ext uri="{28A0092B-C50C-407E-A947-70E740481C1C}">
+                <a14:useLocalDpi xmlns:a14="http://schemas.microsoft.com/office/drawing/2010/main" val="0"/>
+              </a:ext>
+            </a:extLst>
+          </a:blip>
+          <a:stretch>
+            <a:fillRect/>
+          </a:stretch>
+        </p:blipFill>
+        <p:spPr>
+          <a:xfrm>
+            <a:off x="3749858" y="4497957"/>
+            <a:ext cx="909195" cy="804633"/>
+          </a:xfrm>
+          <a:prstGeom prst="rect">
+            <a:avLst/>
+          </a:prstGeom>
+        </p:spPr>
+      </p:pic>
+      <p:pic>
+        <p:nvPicPr>
+          <p:cNvPr id="59" name="Picture 58"/>
+          <p:cNvPicPr>
+            <a:picLocks noChangeAspect="1"/>
+          </p:cNvPicPr>
+          <p:nvPr/>
+        </p:nvPicPr>
+        <p:blipFill>
+          <a:blip r:embed="rId6" cstate="print">
+            <a:extLst>
+              <a:ext uri="{28A0092B-C50C-407E-A947-70E740481C1C}">
+                <a14:useLocalDpi xmlns:a14="http://schemas.microsoft.com/office/drawing/2010/main" val="0"/>
+              </a:ext>
+            </a:extLst>
+          </a:blip>
+          <a:stretch>
+            <a:fillRect/>
+          </a:stretch>
+        </p:blipFill>
+        <p:spPr>
+          <a:xfrm>
+            <a:off x="4599082" y="3661838"/>
+            <a:ext cx="909195" cy="804633"/>
+          </a:xfrm>
+          <a:prstGeom prst="rect">
+            <a:avLst/>
+          </a:prstGeom>
+        </p:spPr>
+      </p:pic>
+      <p:pic>
+        <p:nvPicPr>
+          <p:cNvPr id="60" name="Picture 59"/>
+          <p:cNvPicPr>
+            <a:picLocks noChangeAspect="1"/>
+          </p:cNvPicPr>
+          <p:nvPr/>
+        </p:nvPicPr>
+        <p:blipFill>
+          <a:blip r:embed="rId7" cstate="print">
+            <a:extLst>
+              <a:ext uri="{28A0092B-C50C-407E-A947-70E740481C1C}">
+                <a14:useLocalDpi xmlns:a14="http://schemas.microsoft.com/office/drawing/2010/main" val="0"/>
+              </a:ext>
+            </a:extLst>
+          </a:blip>
+          <a:stretch>
+            <a:fillRect/>
+          </a:stretch>
+        </p:blipFill>
+        <p:spPr>
+          <a:xfrm>
+            <a:off x="4650295" y="4497740"/>
+            <a:ext cx="909195" cy="804633"/>
+          </a:xfrm>
+          <a:prstGeom prst="rect">
+            <a:avLst/>
+          </a:prstGeom>
+        </p:spPr>
+      </p:pic>
+      <p:pic>
+        <p:nvPicPr>
+          <p:cNvPr id="61" name="Picture 60"/>
+          <p:cNvPicPr>
+            <a:picLocks noChangeAspect="1"/>
+          </p:cNvPicPr>
+          <p:nvPr/>
+        </p:nvPicPr>
+        <p:blipFill>
+          <a:blip r:embed="rId8" cstate="print">
+            <a:extLst>
+              <a:ext uri="{28A0092B-C50C-407E-A947-70E740481C1C}">
+                <a14:useLocalDpi xmlns:a14="http://schemas.microsoft.com/office/drawing/2010/main" val="0"/>
+              </a:ext>
+            </a:extLst>
+          </a:blip>
+          <a:stretch>
+            <a:fillRect/>
+          </a:stretch>
+        </p:blipFill>
+        <p:spPr>
+          <a:xfrm>
+            <a:off x="5480691" y="3661621"/>
+            <a:ext cx="909195" cy="804633"/>
+          </a:xfrm>
+          <a:prstGeom prst="rect">
+            <a:avLst/>
+          </a:prstGeom>
+        </p:spPr>
+      </p:pic>
+      <p:pic>
+        <p:nvPicPr>
+          <p:cNvPr id="62" name="Picture 61"/>
+          <p:cNvPicPr>
+            <a:picLocks noChangeAspect="1"/>
+          </p:cNvPicPr>
+          <p:nvPr/>
+        </p:nvPicPr>
+        <p:blipFill>
+          <a:blip r:embed="rId9" cstate="print">
+            <a:extLst>
+              <a:ext uri="{28A0092B-C50C-407E-A947-70E740481C1C}">
+                <a14:useLocalDpi xmlns:a14="http://schemas.microsoft.com/office/drawing/2010/main" val="0"/>
+              </a:ext>
+            </a:extLst>
+          </a:blip>
+          <a:stretch>
+            <a:fillRect/>
+          </a:stretch>
+        </p:blipFill>
+        <p:spPr>
+          <a:xfrm>
+            <a:off x="5519013" y="4511852"/>
+            <a:ext cx="909195" cy="804633"/>
+          </a:xfrm>
+          <a:prstGeom prst="rect">
+            <a:avLst/>
+          </a:prstGeom>
+        </p:spPr>
+      </p:pic>
+      <p:sp>
+        <p:nvSpPr>
+          <p:cNvPr id="67" name="TextBox 66"/>
+          <p:cNvSpPr txBox="1"/>
+          <p:nvPr/>
+        </p:nvSpPr>
+        <p:spPr>
+          <a:xfrm>
+            <a:off x="3816506" y="3577279"/>
+            <a:ext cx="71504" cy="182999"/>
+          </a:xfrm>
+          <a:prstGeom prst="rect">
+            <a:avLst/>
+          </a:prstGeom>
+          <a:noFill/>
+        </p:spPr>
+        <p:txBody>
+          <a:bodyPr wrap="square" rtlCol="0">
+            <a:spAutoFit/>
+          </a:bodyPr>
+          <a:lstStyle/>
+          <a:p>
+            <a:r>
+              <a:rPr lang="en-AU" sz="589" dirty="0" err="1"/>
+              <a:t>i</a:t>
+            </a:r>
+            <a:endParaRPr lang="en-AU" sz="643" dirty="0"/>
+          </a:p>
+        </p:txBody>
+      </p:sp>
+      <p:sp>
+        <p:nvSpPr>
+          <p:cNvPr id="68" name="TextBox 67"/>
+          <p:cNvSpPr txBox="1"/>
+          <p:nvPr/>
+        </p:nvSpPr>
+        <p:spPr>
+          <a:xfrm>
+            <a:off x="4730568" y="3577279"/>
+            <a:ext cx="250262" cy="182999"/>
+          </a:xfrm>
+          <a:prstGeom prst="rect">
+            <a:avLst/>
+          </a:prstGeom>
+          <a:noFill/>
+        </p:spPr>
+        <p:txBody>
+          <a:bodyPr wrap="square" rtlCol="0">
+            <a:spAutoFit/>
+          </a:bodyPr>
+          <a:lstStyle/>
+          <a:p>
+            <a:r>
+              <a:rPr lang="en-AU" sz="589" dirty="0"/>
+              <a:t>iii</a:t>
+            </a:r>
+            <a:endParaRPr lang="en-AU" sz="643" dirty="0"/>
+          </a:p>
+        </p:txBody>
+      </p:sp>
+      <p:sp>
+        <p:nvSpPr>
+          <p:cNvPr id="69" name="TextBox 68"/>
+          <p:cNvSpPr txBox="1"/>
+          <p:nvPr/>
+        </p:nvSpPr>
+        <p:spPr>
+          <a:xfrm>
+            <a:off x="5626184" y="3577279"/>
+            <a:ext cx="197203" cy="182999"/>
+          </a:xfrm>
+          <a:prstGeom prst="rect">
+            <a:avLst/>
+          </a:prstGeom>
+          <a:noFill/>
+        </p:spPr>
+        <p:txBody>
+          <a:bodyPr wrap="square" rtlCol="0">
+            <a:spAutoFit/>
+          </a:bodyPr>
+          <a:lstStyle/>
+          <a:p>
+            <a:r>
+              <a:rPr lang="en-AU" sz="589" dirty="0"/>
+              <a:t>v</a:t>
+            </a:r>
+            <a:endParaRPr lang="en-AU" sz="643" dirty="0"/>
+          </a:p>
+        </p:txBody>
+      </p:sp>
+      <p:sp>
+        <p:nvSpPr>
+          <p:cNvPr id="70" name="TextBox 69"/>
+          <p:cNvSpPr txBox="1"/>
+          <p:nvPr/>
+        </p:nvSpPr>
+        <p:spPr>
+          <a:xfrm>
+            <a:off x="3802294" y="4387897"/>
+            <a:ext cx="148827" cy="273665"/>
+          </a:xfrm>
+          <a:prstGeom prst="rect">
+            <a:avLst/>
+          </a:prstGeom>
+          <a:noFill/>
+        </p:spPr>
+        <p:txBody>
+          <a:bodyPr wrap="square" rtlCol="0">
+            <a:spAutoFit/>
+          </a:bodyPr>
+          <a:lstStyle/>
+          <a:p>
+            <a:r>
+              <a:rPr lang="en-AU" sz="589" dirty="0"/>
+              <a:t>ii</a:t>
+            </a:r>
+            <a:endParaRPr lang="en-AU" sz="643" dirty="0"/>
+          </a:p>
+        </p:txBody>
+      </p:sp>
+      <p:sp>
+        <p:nvSpPr>
+          <p:cNvPr id="71" name="TextBox 70"/>
+          <p:cNvSpPr txBox="1"/>
+          <p:nvPr/>
+        </p:nvSpPr>
+        <p:spPr>
+          <a:xfrm>
+            <a:off x="4698837" y="4387897"/>
+            <a:ext cx="174386" cy="273665"/>
+          </a:xfrm>
+          <a:prstGeom prst="rect">
+            <a:avLst/>
+          </a:prstGeom>
+          <a:noFill/>
+        </p:spPr>
+        <p:txBody>
+          <a:bodyPr wrap="square" rtlCol="0">
+            <a:spAutoFit/>
+          </a:bodyPr>
+          <a:lstStyle/>
+          <a:p>
+            <a:r>
+              <a:rPr lang="en-AU" sz="589" dirty="0"/>
+              <a:t>iv</a:t>
+            </a:r>
+            <a:endParaRPr lang="en-AU" sz="643" dirty="0"/>
+          </a:p>
+        </p:txBody>
+      </p:sp>
+      <p:sp>
+        <p:nvSpPr>
+          <p:cNvPr id="72" name="TextBox 71"/>
+          <p:cNvSpPr txBox="1"/>
+          <p:nvPr/>
+        </p:nvSpPr>
+        <p:spPr>
+          <a:xfrm>
+            <a:off x="5608618" y="4387897"/>
+            <a:ext cx="161148" cy="273665"/>
+          </a:xfrm>
+          <a:prstGeom prst="rect">
+            <a:avLst/>
+          </a:prstGeom>
+          <a:noFill/>
+        </p:spPr>
+        <p:txBody>
+          <a:bodyPr wrap="square" rtlCol="0">
+            <a:spAutoFit/>
+          </a:bodyPr>
+          <a:lstStyle/>
+          <a:p>
+            <a:r>
+              <a:rPr lang="en-AU" sz="589" dirty="0"/>
+              <a:t>vi</a:t>
+            </a:r>
+            <a:endParaRPr lang="en-AU" sz="643" dirty="0"/>
+          </a:p>
+        </p:txBody>
+      </p:sp>
       <p:grpSp>
         <p:nvGrpSpPr>
           <p:cNvPr id="3" name="Group 2"/>

</xml_diff>

<commit_message>
saving doc to cloud
</commit_message>
<xml_diff>
--- a/docs/manuscripts/euc manuscript/figs/fig_panels_120418.pptx
+++ b/docs/manuscripts/euc manuscript/figs/fig_panels_120418.pptx
@@ -709,11 +709,7 @@
             </a:r>
             <a:r>
               <a:rPr lang="en-AU" dirty="0" smtClean="0"/>
-              <a:t>Mean </a:t>
-            </a:r>
-            <a:r>
-              <a:rPr lang="en-AU" dirty="0" smtClean="0"/>
-              <a:t>annual temperature (</a:t>
+              <a:t>Mean annual temperature (</a:t>
             </a:r>
             <a:r>
               <a:rPr lang="en-AU" dirty="0" err="1" smtClean="0"/>
@@ -721,11 +717,7 @@
             </a:r>
             <a:r>
               <a:rPr lang="en-AU" dirty="0" smtClean="0"/>
-              <a:t>) and mean annual precipitation (mm, log scaled) of sampling sites (triangles) were distributed orthogonally with respect to one another (r = </a:t>
-            </a:r>
-            <a:r>
-              <a:rPr lang="en-AU" dirty="0" smtClean="0"/>
-              <a:t>),</a:t>
+              <a:t>) and mean annual precipitation (mm, log scaled) of sampling sites (triangles) were distributed orthogonally with respect to one another (r = ),</a:t>
             </a:r>
             <a:r>
               <a:rPr lang="en-AU" baseline="0" dirty="0" smtClean="0"/>
@@ -768,13 +760,70 @@
             </a:r>
             <a:r>
               <a:rPr lang="en-AU" dirty="0" smtClean="0"/>
-              <a:t>We used a hierarchical protein functional annotation system (MAPMAN/Mercator, ref) to assign proteins to functional groupings. Here we show the average abundances of proteins associated with the major functional groupings in eucalypt leaves; angular fraction indicates the proportion of protein associated with a named functional category. The hierarchical annotation scheme is represented by the layers of the plot: the innermost layer corresponds to the broadest categories in the scheme, e.g. ‘photosynthesis’. Moving outwards, protein amounts are annotated to progressively more specific functions, e.g. ‘light harvesting complex II’. The majority of protein in leaves is associated with photosynthesis (green); protein synthesis, folding and degradation is the second largest top-level category (blue). % values represent</a:t>
+              <a:t>We used </a:t>
+            </a:r>
+            <a:r>
+              <a:rPr lang="en-AU" dirty="0" smtClean="0"/>
+              <a:t>the Mercator protein </a:t>
+            </a:r>
+            <a:r>
+              <a:rPr lang="en-AU" dirty="0" smtClean="0"/>
+              <a:t>functional annotation system </a:t>
+            </a:r>
+            <a:r>
+              <a:rPr lang="en-AU" dirty="0" smtClean="0"/>
+              <a:t>(Lohse</a:t>
+            </a:r>
+            <a:r>
+              <a:rPr lang="en-AU" baseline="0" dirty="0" smtClean="0"/>
+              <a:t> et al. 2013</a:t>
+            </a:r>
+            <a:r>
+              <a:rPr lang="en-AU" dirty="0" smtClean="0"/>
+              <a:t>) </a:t>
+            </a:r>
+            <a:r>
+              <a:rPr lang="en-AU" dirty="0" smtClean="0"/>
+              <a:t>to assign proteins to functional groupings. Here we show the average abundances of proteins associated with the major functional groupings in eucalypt leaves; angular fraction indicates the proportion of protein associated with a named functional category. The hierarchical annotation scheme is represented by the layers of the plot: the innermost layer corresponds to the broadest categories in the scheme, e.g. ‘photosynthesis’. Moving outwards, protein amounts are annotated to progressively more specific functions, e.g. ‘light harvesting complex II’. The majority of protein in leaves is associated with </a:t>
+            </a:r>
+            <a:r>
+              <a:rPr lang="en-AU" dirty="0" smtClean="0"/>
+              <a:t>photosynthesis; </a:t>
+            </a:r>
+            <a:r>
+              <a:rPr lang="en-AU" strike="sngStrike" baseline="0" dirty="0" smtClean="0"/>
+              <a:t>protein synthesis, folding and degradation is the second largest top-level </a:t>
+            </a:r>
+            <a:r>
+              <a:rPr lang="en-AU" strike="sngStrike" baseline="0" dirty="0" smtClean="0"/>
+              <a:t>category.</a:t>
+            </a:r>
+            <a:r>
+              <a:rPr lang="en-AU" dirty="0" smtClean="0"/>
+              <a:t> </a:t>
+            </a:r>
+            <a:r>
+              <a:rPr lang="en-AU" dirty="0" smtClean="0"/>
+              <a:t>% values represent</a:t>
             </a:r>
             <a:r>
               <a:rPr lang="en-AU" baseline="0" dirty="0" smtClean="0"/>
               <a:t> averages of leaf 324 samples across 32 eucalypt species.</a:t>
             </a:r>
             <a:endParaRPr lang="en-AU" dirty="0" smtClean="0"/>
+          </a:p>
+          <a:p>
+            <a:endParaRPr lang="en-AU" dirty="0" smtClean="0"/>
+          </a:p>
+          <a:p>
+            <a:r>
+              <a:rPr lang="en-AU" dirty="0" smtClean="0"/>
+              <a:t>d.</a:t>
+            </a:r>
+            <a:r>
+              <a:rPr lang="en-AU" baseline="0" dirty="0" smtClean="0"/>
+              <a:t>) Abundance of photosynthesis-related proteins in the average eucalypt leaf.</a:t>
+            </a:r>
           </a:p>
           <a:p>
             <a:endParaRPr lang="en-AU" dirty="0" smtClean="0"/>
@@ -814,8 +863,164 @@
                 <a:ea typeface="+mn-ea"/>
                 <a:cs typeface="+mn-cs"/>
               </a:rPr>
-              <a:t> MacMillan Publishing, New York, USA.</a:t>
-            </a:r>
+              <a:t> MacMillan Publishing, New York, USA</a:t>
+            </a:r>
+            <a:r>
+              <a:rPr lang="en-AU" sz="1200" b="0" i="0" kern="1200" dirty="0" smtClean="0">
+                <a:solidFill>
+                  <a:schemeClr val="tx1"/>
+                </a:solidFill>
+                <a:effectLst/>
+                <a:latin typeface="+mn-lt"/>
+                <a:ea typeface="+mn-ea"/>
+                <a:cs typeface="+mn-cs"/>
+              </a:rPr>
+              <a:t>.</a:t>
+            </a:r>
+          </a:p>
+          <a:p>
+            <a:pPr fontAlgn="t"/>
+            <a:r>
+              <a:rPr lang="en-AU" sz="1200" kern="1200" dirty="0" smtClean="0">
+                <a:solidFill>
+                  <a:schemeClr val="tx1"/>
+                </a:solidFill>
+                <a:effectLst/>
+                <a:latin typeface="+mn-lt"/>
+                <a:ea typeface="+mn-ea"/>
+                <a:cs typeface="+mn-cs"/>
+              </a:rPr>
+              <a:t>Lohse, M., Nagel, A., Herter, T., May, P., </a:t>
+            </a:r>
+            <a:r>
+              <a:rPr lang="en-AU" sz="1200" kern="1200" dirty="0" err="1" smtClean="0">
+                <a:solidFill>
+                  <a:schemeClr val="tx1"/>
+                </a:solidFill>
+                <a:effectLst/>
+                <a:latin typeface="+mn-lt"/>
+                <a:ea typeface="+mn-ea"/>
+                <a:cs typeface="+mn-cs"/>
+              </a:rPr>
+              <a:t>Schroda</a:t>
+            </a:r>
+            <a:r>
+              <a:rPr lang="en-AU" sz="1200" kern="1200" dirty="0" smtClean="0">
+                <a:solidFill>
+                  <a:schemeClr val="tx1"/>
+                </a:solidFill>
+                <a:effectLst/>
+                <a:latin typeface="+mn-lt"/>
+                <a:ea typeface="+mn-ea"/>
+                <a:cs typeface="+mn-cs"/>
+              </a:rPr>
+              <a:t>, M., </a:t>
+            </a:r>
+            <a:r>
+              <a:rPr lang="en-AU" sz="1200" kern="1200" dirty="0" err="1" smtClean="0">
+                <a:solidFill>
+                  <a:schemeClr val="tx1"/>
+                </a:solidFill>
+                <a:effectLst/>
+                <a:latin typeface="+mn-lt"/>
+                <a:ea typeface="+mn-ea"/>
+                <a:cs typeface="+mn-cs"/>
+              </a:rPr>
+              <a:t>Zrenner</a:t>
+            </a:r>
+            <a:r>
+              <a:rPr lang="en-AU" sz="1200" kern="1200" dirty="0" smtClean="0">
+                <a:solidFill>
+                  <a:schemeClr val="tx1"/>
+                </a:solidFill>
+                <a:effectLst/>
+                <a:latin typeface="+mn-lt"/>
+                <a:ea typeface="+mn-ea"/>
+                <a:cs typeface="+mn-cs"/>
+              </a:rPr>
+              <a:t>, R., Stitt, M., &amp; </a:t>
+            </a:r>
+            <a:r>
+              <a:rPr lang="en-AU" sz="1200" kern="1200" dirty="0" err="1" smtClean="0">
+                <a:solidFill>
+                  <a:schemeClr val="tx1"/>
+                </a:solidFill>
+                <a:effectLst/>
+                <a:latin typeface="+mn-lt"/>
+                <a:ea typeface="+mn-ea"/>
+                <a:cs typeface="+mn-cs"/>
+              </a:rPr>
+              <a:t>Usadel</a:t>
+            </a:r>
+            <a:r>
+              <a:rPr lang="en-AU" sz="1200" kern="1200" dirty="0" smtClean="0">
+                <a:solidFill>
+                  <a:schemeClr val="tx1"/>
+                </a:solidFill>
+                <a:effectLst/>
+                <a:latin typeface="+mn-lt"/>
+                <a:ea typeface="+mn-ea"/>
+                <a:cs typeface="+mn-cs"/>
+              </a:rPr>
+              <a:t>, B. (2014). Mercator: a fast and simple web server for genome scale functional annotation of plant sequence data. </a:t>
+            </a:r>
+            <a:r>
+              <a:rPr lang="en-AU" sz="1200" i="1" kern="1200" dirty="0" smtClean="0">
+                <a:solidFill>
+                  <a:schemeClr val="tx1"/>
+                </a:solidFill>
+                <a:effectLst/>
+                <a:latin typeface="+mn-lt"/>
+                <a:ea typeface="+mn-ea"/>
+                <a:cs typeface="+mn-cs"/>
+              </a:rPr>
+              <a:t>Plant, cell &amp; environment</a:t>
+            </a:r>
+            <a:r>
+              <a:rPr lang="en-AU" sz="1200" kern="1200" dirty="0" smtClean="0">
+                <a:solidFill>
+                  <a:schemeClr val="tx1"/>
+                </a:solidFill>
+                <a:effectLst/>
+                <a:latin typeface="+mn-lt"/>
+                <a:ea typeface="+mn-ea"/>
+                <a:cs typeface="+mn-cs"/>
+              </a:rPr>
+              <a:t>, </a:t>
+            </a:r>
+            <a:r>
+              <a:rPr lang="en-AU" sz="1200" i="1" kern="1200" dirty="0" smtClean="0">
+                <a:solidFill>
+                  <a:schemeClr val="tx1"/>
+                </a:solidFill>
+                <a:effectLst/>
+                <a:latin typeface="+mn-lt"/>
+                <a:ea typeface="+mn-ea"/>
+                <a:cs typeface="+mn-cs"/>
+              </a:rPr>
+              <a:t>37</a:t>
+            </a:r>
+            <a:r>
+              <a:rPr lang="en-AU" sz="1200" kern="1200" dirty="0" smtClean="0">
+                <a:solidFill>
+                  <a:schemeClr val="tx1"/>
+                </a:solidFill>
+                <a:effectLst/>
+                <a:latin typeface="+mn-lt"/>
+                <a:ea typeface="+mn-ea"/>
+                <a:cs typeface="+mn-cs"/>
+              </a:rPr>
+              <a:t>(5), 1250-1258.</a:t>
+            </a:r>
+          </a:p>
+          <a:p>
+            <a:r>
+              <a:rPr lang="en-AU" dirty="0" smtClean="0"/>
+              <a:t/>
+            </a:r>
+            <a:br>
+              <a:rPr lang="en-AU" dirty="0" smtClean="0"/>
+            </a:br>
             <a:endParaRPr lang="en-AU" dirty="0"/>
           </a:p>
         </p:txBody>
@@ -915,8 +1120,29 @@
                 <a:ea typeface="+mn-ea"/>
                 <a:cs typeface="+mn-cs"/>
               </a:rPr>
-              <a:t>3.) Linking leaf protein abundances with environment and functional traits. </a:t>
-            </a:r>
+              <a:t>3.) Linking leaf protein abundances with environment and functional </a:t>
+            </a:r>
+            <a:r>
+              <a:rPr lang="en-AU" sz="1680" b="1" kern="1200" dirty="0" smtClean="0">
+                <a:solidFill>
+                  <a:schemeClr val="tx1"/>
+                </a:solidFill>
+                <a:effectLst/>
+                <a:latin typeface="+mn-lt"/>
+                <a:ea typeface="+mn-ea"/>
+                <a:cs typeface="+mn-cs"/>
+              </a:rPr>
+              <a:t>traits</a:t>
+            </a:r>
+            <a:endParaRPr lang="en-AU" sz="1680" b="1" kern="1200" dirty="0" smtClean="0">
+              <a:solidFill>
+                <a:schemeClr val="tx1"/>
+              </a:solidFill>
+              <a:effectLst/>
+              <a:latin typeface="+mn-lt"/>
+              <a:ea typeface="+mn-ea"/>
+              <a:cs typeface="+mn-cs"/>
+            </a:endParaRPr>
           </a:p>
           <a:p>
             <a:endParaRPr lang="en-AU" sz="1680" kern="1200" dirty="0" smtClean="0">

</xml_diff>

<commit_message>
updated captions in figure panels, added some reference info to intro-results doc'
</commit_message>
<xml_diff>
--- a/docs/manuscripts/euc manuscript/figs/fig_panels_120418.pptx
+++ b/docs/manuscripts/euc manuscript/figs/fig_panels_120418.pptx
@@ -199,7 +199,7 @@
           <a:p>
             <a:fld id="{46CB1FCB-FFF7-4A61-A5C6-C50455374D1F}" type="datetimeFigureOut">
               <a:rPr lang="en-AU" smtClean="0"/>
-              <a:t>24/04/2018</a:t>
+              <a:t>8/05/2018</a:t>
             </a:fld>
             <a:endParaRPr lang="en-AU"/>
           </a:p>
@@ -760,19 +760,7 @@
             </a:r>
             <a:r>
               <a:rPr lang="en-AU" dirty="0" smtClean="0"/>
-              <a:t>We used </a:t>
-            </a:r>
-            <a:r>
-              <a:rPr lang="en-AU" dirty="0" smtClean="0"/>
-              <a:t>the Mercator protein </a:t>
-            </a:r>
-            <a:r>
-              <a:rPr lang="en-AU" dirty="0" smtClean="0"/>
-              <a:t>functional annotation system </a:t>
-            </a:r>
-            <a:r>
-              <a:rPr lang="en-AU" dirty="0" smtClean="0"/>
-              <a:t>(Lohse</a:t>
+              <a:t>We used the Mercator protein functional annotation system (Lohse</a:t>
             </a:r>
             <a:r>
               <a:rPr lang="en-AU" baseline="0" dirty="0" smtClean="0"/>
@@ -780,31 +768,15 @@
             </a:r>
             <a:r>
               <a:rPr lang="en-AU" dirty="0" smtClean="0"/>
-              <a:t>) </a:t>
+              <a:t>) to assign proteins to functional groupings. Here we show the average abundances of proteins associated with the major functional groupings in eucalypt leaves; angular fraction indicates the proportion of protein associated with a named functional category. The hierarchical annotation scheme is represented by the layers of the plot: the innermost layer corresponds to the broadest categories in the scheme, e.g. ‘photosynthesis’. Moving outwards, protein amounts are annotated to progressively more specific functions, e.g. ‘light harvesting complex II’. The majority of protein in leaves is associated with photosynthesis; </a:t>
+            </a:r>
+            <a:r>
+              <a:rPr lang="en-AU" strike="sngStrike" baseline="0" dirty="0" smtClean="0"/>
+              <a:t>protein synthesis, folding and degradation is the second largest top-level category.</a:t>
             </a:r>
             <a:r>
               <a:rPr lang="en-AU" dirty="0" smtClean="0"/>
-              <a:t>to assign proteins to functional groupings. Here we show the average abundances of proteins associated with the major functional groupings in eucalypt leaves; angular fraction indicates the proportion of protein associated with a named functional category. The hierarchical annotation scheme is represented by the layers of the plot: the innermost layer corresponds to the broadest categories in the scheme, e.g. ‘photosynthesis’. Moving outwards, protein amounts are annotated to progressively more specific functions, e.g. ‘light harvesting complex II’. The majority of protein in leaves is associated with </a:t>
-            </a:r>
-            <a:r>
-              <a:rPr lang="en-AU" dirty="0" smtClean="0"/>
-              <a:t>photosynthesis; </a:t>
-            </a:r>
-            <a:r>
-              <a:rPr lang="en-AU" strike="sngStrike" baseline="0" dirty="0" smtClean="0"/>
-              <a:t>protein synthesis, folding and degradation is the second largest top-level </a:t>
-            </a:r>
-            <a:r>
-              <a:rPr lang="en-AU" strike="sngStrike" baseline="0" dirty="0" smtClean="0"/>
-              <a:t>category.</a:t>
-            </a:r>
-            <a:r>
-              <a:rPr lang="en-AU" dirty="0" smtClean="0"/>
-              <a:t> </a:t>
-            </a:r>
-            <a:r>
-              <a:rPr lang="en-AU" dirty="0" smtClean="0"/>
-              <a:t>% values represent</a:t>
+              <a:t> % values represent</a:t>
             </a:r>
             <a:r>
               <a:rPr lang="en-AU" baseline="0" dirty="0" smtClean="0"/>
@@ -863,19 +835,7 @@
                 <a:ea typeface="+mn-ea"/>
                 <a:cs typeface="+mn-cs"/>
               </a:rPr>
-              <a:t> MacMillan Publishing, New York, USA</a:t>
-            </a:r>
-            <a:r>
-              <a:rPr lang="en-AU" sz="1200" b="0" i="0" kern="1200" dirty="0" smtClean="0">
-                <a:solidFill>
-                  <a:schemeClr val="tx1"/>
-                </a:solidFill>
-                <a:effectLst/>
-                <a:latin typeface="+mn-lt"/>
-                <a:ea typeface="+mn-ea"/>
-                <a:cs typeface="+mn-cs"/>
-              </a:rPr>
-              <a:t>.</a:t>
+              <a:t> MacMillan Publishing, New York, USA.</a:t>
             </a:r>
           </a:p>
           <a:p>
@@ -1120,29 +1080,8 @@
                 <a:ea typeface="+mn-ea"/>
                 <a:cs typeface="+mn-cs"/>
               </a:rPr>
-              <a:t>3.) Linking leaf protein abundances with environment and functional </a:t>
-            </a:r>
-            <a:r>
-              <a:rPr lang="en-AU" sz="1680" b="1" kern="1200" dirty="0" smtClean="0">
-                <a:solidFill>
-                  <a:schemeClr val="tx1"/>
-                </a:solidFill>
-                <a:effectLst/>
-                <a:latin typeface="+mn-lt"/>
-                <a:ea typeface="+mn-ea"/>
-                <a:cs typeface="+mn-cs"/>
-              </a:rPr>
-              <a:t>traits</a:t>
-            </a:r>
-            <a:endParaRPr lang="en-AU" sz="1680" b="1" kern="1200" dirty="0" smtClean="0">
-              <a:solidFill>
-                <a:schemeClr val="tx1"/>
-              </a:solidFill>
-              <a:effectLst/>
-              <a:latin typeface="+mn-lt"/>
-              <a:ea typeface="+mn-ea"/>
-              <a:cs typeface="+mn-cs"/>
-            </a:endParaRPr>
+              <a:t>3.) Linking leaf protein abundances with environment and functional traits</a:t>
+            </a:r>
           </a:p>
           <a:p>
             <a:endParaRPr lang="en-AU" sz="1680" kern="1200" dirty="0" smtClean="0">
@@ -1215,7 +1154,103 @@
                 <a:ea typeface="+mn-ea"/>
                 <a:cs typeface="+mn-cs"/>
               </a:rPr>
-              <a:t>Protein abundances on a per leaf area basis tend to be strongly cross-correlated. A strong positive relationship with leaf nitrogen content is apparent, as expected, together with a somewhat weaker correlation with leaf mass per area. Abundance of proteins associated with individual protein functional categories decline with mean annual temperature and precipitation – a trend which is underpinned by the negative relationship between total leaf protein and these environmental variables (Fig 1e).</a:t>
+              <a:t>b.) We selected several relationships for deeper analysis which are of current interest to the vegetation modelling community, but which to date have only been investigated via proxies. Trends in abundance of photosystem proteins [symbol, colour] and Calvin cycle enzymes [symbol, colour] are shown across gradients of: </a:t>
+            </a:r>
+            <a:r>
+              <a:rPr lang="en-AU" sz="1680" kern="1200" dirty="0" err="1" smtClean="0">
+                <a:solidFill>
+                  <a:schemeClr val="tx1"/>
+                </a:solidFill>
+                <a:effectLst/>
+                <a:latin typeface="+mn-lt"/>
+                <a:ea typeface="+mn-ea"/>
+                <a:cs typeface="+mn-cs"/>
+              </a:rPr>
+              <a:t>i,ii</a:t>
+            </a:r>
+            <a:r>
+              <a:rPr lang="en-AU" sz="1680" kern="1200" dirty="0" smtClean="0">
+                <a:solidFill>
+                  <a:schemeClr val="tx1"/>
+                </a:solidFill>
+                <a:effectLst/>
+                <a:latin typeface="+mn-lt"/>
+                <a:ea typeface="+mn-ea"/>
+                <a:cs typeface="+mn-cs"/>
+              </a:rPr>
+              <a:t>.) canopy-corrected mean annual irradiance (MJ/m2/year), R2 = , modelled change (%) = , p = ; </a:t>
+            </a:r>
+            <a:r>
+              <a:rPr lang="en-AU" sz="1680" kern="1200" dirty="0" err="1" smtClean="0">
+                <a:solidFill>
+                  <a:schemeClr val="tx1"/>
+                </a:solidFill>
+                <a:effectLst/>
+                <a:latin typeface="+mn-lt"/>
+                <a:ea typeface="+mn-ea"/>
+                <a:cs typeface="+mn-cs"/>
+              </a:rPr>
+              <a:t>iii,iv</a:t>
+            </a:r>
+            <a:r>
+              <a:rPr lang="en-AU" sz="1680" kern="1200" dirty="0" smtClean="0">
+                <a:solidFill>
+                  <a:schemeClr val="tx1"/>
+                </a:solidFill>
+                <a:effectLst/>
+                <a:latin typeface="+mn-lt"/>
+                <a:ea typeface="+mn-ea"/>
+                <a:cs typeface="+mn-cs"/>
+              </a:rPr>
+              <a:t>.) mean annual precipitation (MAP, mm/year) R2 = , modelled change (%) = , p = ; </a:t>
+            </a:r>
+            <a:r>
+              <a:rPr lang="en-AU" sz="1680" kern="1200" dirty="0" err="1" smtClean="0">
+                <a:solidFill>
+                  <a:schemeClr val="tx1"/>
+                </a:solidFill>
+                <a:effectLst/>
+                <a:latin typeface="+mn-lt"/>
+                <a:ea typeface="+mn-ea"/>
+                <a:cs typeface="+mn-cs"/>
+              </a:rPr>
+              <a:t>v,vi</a:t>
+            </a:r>
+            <a:r>
+              <a:rPr lang="en-AU" sz="1680" kern="1200" dirty="0" smtClean="0">
+                <a:solidFill>
+                  <a:schemeClr val="tx1"/>
+                </a:solidFill>
+                <a:effectLst/>
+                <a:latin typeface="+mn-lt"/>
+                <a:ea typeface="+mn-ea"/>
+                <a:cs typeface="+mn-cs"/>
+              </a:rPr>
+              <a:t>.) mean annual temperature (MAT, </a:t>
+            </a:r>
+            <a:r>
+              <a:rPr lang="en-AU" sz="1680" kern="1200" dirty="0" err="1" smtClean="0">
+                <a:solidFill>
+                  <a:schemeClr val="tx1"/>
+                </a:solidFill>
+                <a:effectLst/>
+                <a:latin typeface="+mn-lt"/>
+                <a:ea typeface="+mn-ea"/>
+                <a:cs typeface="+mn-cs"/>
+              </a:rPr>
+              <a:t>oC</a:t>
+            </a:r>
+            <a:r>
+              <a:rPr lang="en-AU" sz="1680" kern="1200" dirty="0" smtClean="0">
+                <a:solidFill>
+                  <a:schemeClr val="tx1"/>
+                </a:solidFill>
+                <a:effectLst/>
+                <a:latin typeface="+mn-lt"/>
+                <a:ea typeface="+mn-ea"/>
+                <a:cs typeface="+mn-cs"/>
+              </a:rPr>
+              <a:t>) R2 = , modelled change (%) = , p =.</a:t>
             </a:r>
           </a:p>
           <a:p>
@@ -1240,7 +1275,127 @@
                 <a:ea typeface="+mn-ea"/>
                 <a:cs typeface="+mn-cs"/>
               </a:rPr>
-              <a:t>Proportional protein abundance of a protein functional category indicates investment in a defined function relative to investment in all other functions, and can be viewed as an allocation trait. A number of trends in protein allocation were apparent across environmental gradients and in relation to functional traits. For example, allocation to light capturing protein (represented by the ‘photosystems’ category), was negatively related to measures of light availability (incident irradiance and canopy gap fraction). Proportional abundances also offer a clearer means to look at how abundances of proteins associated with different functions are related. For example, protein allocation to photorespiration strongly tracks allocation to Calvin cycle proteins, indicating that greater capacity for carboxylation requires a greater capacity to deal with the consequences of photorespiration. </a:t>
+              <a:t>Points represent the average protein abundance for individual species * site combinations (n = </a:t>
+            </a:r>
+            <a:r>
+              <a:rPr lang="en-AU" sz="1680" kern="1200" dirty="0" smtClean="0">
+                <a:solidFill>
+                  <a:schemeClr val="tx1"/>
+                </a:solidFill>
+                <a:effectLst/>
+                <a:latin typeface="+mn-lt"/>
+                <a:ea typeface="+mn-ea"/>
+                <a:cs typeface="+mn-cs"/>
+              </a:rPr>
+              <a:t>9, </a:t>
+            </a:r>
+            <a:r>
+              <a:rPr lang="en-AU" sz="1680" kern="1200" dirty="0" smtClean="0">
+                <a:solidFill>
+                  <a:schemeClr val="tx1"/>
+                </a:solidFill>
+                <a:effectLst/>
+                <a:latin typeface="+mn-lt"/>
+                <a:ea typeface="+mn-ea"/>
+                <a:cs typeface="+mn-cs"/>
+              </a:rPr>
+              <a:t>3 leaves from each of 3 </a:t>
+            </a:r>
+            <a:r>
+              <a:rPr lang="en-AU" sz="1680" kern="1200" dirty="0" smtClean="0">
+                <a:solidFill>
+                  <a:schemeClr val="tx1"/>
+                </a:solidFill>
+                <a:effectLst/>
+                <a:latin typeface="+mn-lt"/>
+                <a:ea typeface="+mn-ea"/>
+                <a:cs typeface="+mn-cs"/>
+              </a:rPr>
+              <a:t>individuals</a:t>
+            </a:r>
+            <a:r>
+              <a:rPr lang="en-AU" sz="1680" kern="1200" baseline="30000" dirty="0" smtClean="0">
+                <a:solidFill>
+                  <a:schemeClr val="tx1"/>
+                </a:solidFill>
+                <a:effectLst/>
+                <a:latin typeface="+mn-lt"/>
+                <a:ea typeface="+mn-ea"/>
+                <a:cs typeface="+mn-cs"/>
+              </a:rPr>
+              <a:t>*</a:t>
+            </a:r>
+            <a:r>
+              <a:rPr lang="en-AU" sz="1680" kern="1200" dirty="0" smtClean="0">
+                <a:solidFill>
+                  <a:schemeClr val="tx1"/>
+                </a:solidFill>
+                <a:effectLst/>
+                <a:latin typeface="+mn-lt"/>
+                <a:ea typeface="+mn-ea"/>
+                <a:cs typeface="+mn-cs"/>
+              </a:rPr>
+              <a:t>). </a:t>
+            </a:r>
+            <a:r>
+              <a:rPr lang="en-AU" sz="1680" kern="1200" dirty="0" smtClean="0">
+                <a:solidFill>
+                  <a:schemeClr val="tx1"/>
+                </a:solidFill>
+                <a:effectLst/>
+                <a:latin typeface="+mn-lt"/>
+                <a:ea typeface="+mn-ea"/>
+                <a:cs typeface="+mn-cs"/>
+              </a:rPr>
+              <a:t>SEM error bars are presented for protein abundances and for canopy-corrected irradiances, since mean canopy openness values are derived from measurements of three individuals. Model fits (OLS regression) are shown where p &lt; 0.05. A full table of univariate OLS regression statistics associated with Fig </a:t>
+            </a:r>
+            <a:r>
+              <a:rPr lang="en-AU" sz="1680" kern="1200" dirty="0" err="1" smtClean="0">
+                <a:solidFill>
+                  <a:schemeClr val="tx1"/>
+                </a:solidFill>
+                <a:effectLst/>
+                <a:latin typeface="+mn-lt"/>
+                <a:ea typeface="+mn-ea"/>
+                <a:cs typeface="+mn-cs"/>
+              </a:rPr>
+              <a:t>Xb</a:t>
+            </a:r>
+            <a:r>
+              <a:rPr lang="en-AU" sz="1680" kern="1200" dirty="0" smtClean="0">
+                <a:solidFill>
+                  <a:schemeClr val="tx1"/>
+                </a:solidFill>
+                <a:effectLst/>
+                <a:latin typeface="+mn-lt"/>
+                <a:ea typeface="+mn-ea"/>
+                <a:cs typeface="+mn-cs"/>
+              </a:rPr>
+              <a:t> and </a:t>
+            </a:r>
+            <a:r>
+              <a:rPr lang="en-AU" sz="1680" kern="1200" dirty="0" err="1" smtClean="0">
+                <a:solidFill>
+                  <a:schemeClr val="tx1"/>
+                </a:solidFill>
+                <a:effectLst/>
+                <a:latin typeface="+mn-lt"/>
+                <a:ea typeface="+mn-ea"/>
+                <a:cs typeface="+mn-cs"/>
+              </a:rPr>
+              <a:t>Xc</a:t>
+            </a:r>
+            <a:r>
+              <a:rPr lang="en-AU" sz="1680" kern="1200" dirty="0" smtClean="0">
+                <a:solidFill>
+                  <a:schemeClr val="tx1"/>
+                </a:solidFill>
+                <a:effectLst/>
+                <a:latin typeface="+mn-lt"/>
+                <a:ea typeface="+mn-ea"/>
+                <a:cs typeface="+mn-cs"/>
+              </a:rPr>
+              <a:t> is provided in the supplementary materials.</a:t>
             </a:r>
           </a:p>
           <a:p>
@@ -1265,7 +1420,7 @@
                 <a:ea typeface="+mn-ea"/>
                 <a:cs typeface="+mn-cs"/>
               </a:rPr>
-              <a:t>b.) We selected several relationships for deeper analysis which are of current interest to the vegetation modelling community, but which to date have only been investigated via proxies. Trends in abundance of photosystem proteins [symbol, colour] and Calvin cycle enzymes [symbol, colour] are shown across gradients of: </a:t>
+              <a:t>The top row of the lower panel (</a:t>
             </a:r>
             <a:r>
               <a:rPr lang="en-AU" sz="1680" kern="1200" dirty="0" err="1" smtClean="0">
@@ -1277,7 +1432,7 @@
                 <a:ea typeface="+mn-ea"/>
                 <a:cs typeface="+mn-cs"/>
               </a:rPr>
-              <a:t>i,ii</a:t>
+              <a:t>i</a:t>
             </a:r>
             <a:r>
               <a:rPr lang="en-AU" sz="1680" kern="1200" dirty="0" smtClean="0">
@@ -1289,79 +1444,7 @@
                 <a:ea typeface="+mn-ea"/>
                 <a:cs typeface="+mn-cs"/>
               </a:rPr>
-              <a:t>.) canopy-corrected mean annual irradiance (MJ/m2/year), R2 = , modelled change (%) = , p = ; </a:t>
-            </a:r>
-            <a:r>
-              <a:rPr lang="en-AU" sz="1680" kern="1200" dirty="0" err="1" smtClean="0">
-                <a:solidFill>
-                  <a:schemeClr val="tx1"/>
-                </a:solidFill>
-                <a:effectLst/>
-                <a:latin typeface="+mn-lt"/>
-                <a:ea typeface="+mn-ea"/>
-                <a:cs typeface="+mn-cs"/>
-              </a:rPr>
-              <a:t>iii,iv</a:t>
-            </a:r>
-            <a:r>
-              <a:rPr lang="en-AU" sz="1680" kern="1200" dirty="0" smtClean="0">
-                <a:solidFill>
-                  <a:schemeClr val="tx1"/>
-                </a:solidFill>
-                <a:effectLst/>
-                <a:latin typeface="+mn-lt"/>
-                <a:ea typeface="+mn-ea"/>
-                <a:cs typeface="+mn-cs"/>
-              </a:rPr>
-              <a:t>.) mean annual precipitation (MAP, mm/year) R2 = , modelled change (%) = , p = ; </a:t>
-            </a:r>
-            <a:r>
-              <a:rPr lang="en-AU" sz="1680" kern="1200" dirty="0" err="1" smtClean="0">
-                <a:solidFill>
-                  <a:schemeClr val="tx1"/>
-                </a:solidFill>
-                <a:effectLst/>
-                <a:latin typeface="+mn-lt"/>
-                <a:ea typeface="+mn-ea"/>
-                <a:cs typeface="+mn-cs"/>
-              </a:rPr>
-              <a:t>v,vi</a:t>
-            </a:r>
-            <a:r>
-              <a:rPr lang="en-AU" sz="1680" kern="1200" dirty="0" smtClean="0">
-                <a:solidFill>
-                  <a:schemeClr val="tx1"/>
-                </a:solidFill>
-                <a:effectLst/>
-                <a:latin typeface="+mn-lt"/>
-                <a:ea typeface="+mn-ea"/>
-                <a:cs typeface="+mn-cs"/>
-              </a:rPr>
-              <a:t>.) mean annual temperature (MAT, </a:t>
-            </a:r>
-            <a:r>
-              <a:rPr lang="en-AU" sz="1680" kern="1200" dirty="0" err="1" smtClean="0">
-                <a:solidFill>
-                  <a:schemeClr val="tx1"/>
-                </a:solidFill>
-                <a:effectLst/>
-                <a:latin typeface="+mn-lt"/>
-                <a:ea typeface="+mn-ea"/>
-                <a:cs typeface="+mn-cs"/>
-              </a:rPr>
-              <a:t>oC</a:t>
-            </a:r>
-            <a:r>
-              <a:rPr lang="en-AU" sz="1680" kern="1200" dirty="0" smtClean="0">
-                <a:solidFill>
-                  <a:schemeClr val="tx1"/>
-                </a:solidFill>
-                <a:effectLst/>
-                <a:latin typeface="+mn-lt"/>
-                <a:ea typeface="+mn-ea"/>
-                <a:cs typeface="+mn-cs"/>
-              </a:rPr>
-              <a:t>) R2 = , modelled change (%) = , p =.</a:t>
+              <a:t>, iii, v) shows models fit using protein abundances expressed on a proportional basis; the bottom row (ii, iv, vi,) shows models fit using protein abundances expressed on a per leaf area basis (mg protein / m2 leaf area). </a:t>
             </a:r>
           </a:p>
           <a:p>
@@ -1377,6 +1460,18 @@
           </a:p>
           <a:p>
             <a:r>
+              <a:rPr lang="en-AU" sz="1680" kern="1200" baseline="30000" dirty="0" smtClean="0">
+                <a:solidFill>
+                  <a:schemeClr val="tx1"/>
+                </a:solidFill>
+                <a:effectLst/>
+                <a:latin typeface="+mn-lt"/>
+                <a:ea typeface="+mn-ea"/>
+                <a:cs typeface="+mn-cs"/>
+              </a:rPr>
+              <a:t>*</a:t>
+            </a:r>
+            <a:r>
               <a:rPr lang="en-AU" sz="1680" kern="1200" dirty="0" smtClean="0">
                 <a:solidFill>
                   <a:schemeClr val="tx1"/>
@@ -1386,55 +1481,19 @@
                 <a:ea typeface="+mn-ea"/>
                 <a:cs typeface="+mn-cs"/>
               </a:rPr>
-              <a:t>Points represent the average protein abundance for individual species * site combinations (n = 9, 3 leaves from each of 3 individuals). SEM error bars are presented for protein abundances and for canopy-corrected irradiances, since mean canopy openness values are derived from measurements of three individuals. Model fits (OLS regression) are shown where p &lt; 0.05. A full table of univariate OLS regression statistics associated with Fig </a:t>
-            </a:r>
-            <a:r>
-              <a:rPr lang="en-AU" sz="1680" kern="1200" dirty="0" err="1" smtClean="0">
-                <a:solidFill>
-                  <a:schemeClr val="tx1"/>
-                </a:solidFill>
-                <a:effectLst/>
-                <a:latin typeface="+mn-lt"/>
-                <a:ea typeface="+mn-ea"/>
-                <a:cs typeface="+mn-cs"/>
-              </a:rPr>
-              <a:t>Xb</a:t>
-            </a:r>
-            <a:r>
-              <a:rPr lang="en-AU" sz="1680" kern="1200" dirty="0" smtClean="0">
-                <a:solidFill>
-                  <a:schemeClr val="tx1"/>
-                </a:solidFill>
-                <a:effectLst/>
-                <a:latin typeface="+mn-lt"/>
-                <a:ea typeface="+mn-ea"/>
-                <a:cs typeface="+mn-cs"/>
-              </a:rPr>
-              <a:t> and </a:t>
-            </a:r>
-            <a:r>
-              <a:rPr lang="en-AU" sz="1680" kern="1200" dirty="0" err="1" smtClean="0">
-                <a:solidFill>
-                  <a:schemeClr val="tx1"/>
-                </a:solidFill>
-                <a:effectLst/>
-                <a:latin typeface="+mn-lt"/>
-                <a:ea typeface="+mn-ea"/>
-                <a:cs typeface="+mn-cs"/>
-              </a:rPr>
-              <a:t>Xc</a:t>
-            </a:r>
-            <a:r>
-              <a:rPr lang="en-AU" sz="1680" kern="1200" dirty="0" smtClean="0">
-                <a:solidFill>
-                  <a:schemeClr val="tx1"/>
-                </a:solidFill>
-                <a:effectLst/>
-                <a:latin typeface="+mn-lt"/>
-                <a:ea typeface="+mn-ea"/>
-                <a:cs typeface="+mn-cs"/>
-              </a:rPr>
-              <a:t> is provided in the supplementary materials.</a:t>
+              <a:t> some</a:t>
+            </a:r>
+            <a:r>
+              <a:rPr lang="en-AU" sz="1680" kern="1200" baseline="0" dirty="0" smtClean="0">
+                <a:solidFill>
+                  <a:schemeClr val="tx1"/>
+                </a:solidFill>
+                <a:effectLst/>
+                <a:latin typeface="+mn-lt"/>
+                <a:ea typeface="+mn-ea"/>
+                <a:cs typeface="+mn-cs"/>
+              </a:rPr>
+              <a:t> species * site combinations had n &lt; 3</a:t>
             </a:r>
           </a:p>
           <a:p>
@@ -1449,6 +1508,23 @@
             </a:endParaRPr>
           </a:p>
           <a:p>
+            <a:pPr marL="0" marR="0" indent="0" algn="l" defTabSz="914400" rtl="0" eaLnBrk="1" fontAlgn="auto" latinLnBrk="0" hangingPunct="1">
+              <a:lnSpc>
+                <a:spcPct val="100000"/>
+              </a:lnSpc>
+              <a:spcBef>
+                <a:spcPts val="0"/>
+              </a:spcBef>
+              <a:spcAft>
+                <a:spcPts val="0"/>
+              </a:spcAft>
+              <a:buClrTx/>
+              <a:buSzTx/>
+              <a:buFontTx/>
+              <a:buNone/>
+              <a:tabLst/>
+              <a:defRPr/>
+            </a:pPr>
             <a:r>
               <a:rPr lang="en-AU" sz="1680" kern="1200" dirty="0" smtClean="0">
                 <a:solidFill>
@@ -1459,7 +1535,43 @@
                 <a:ea typeface="+mn-ea"/>
                 <a:cs typeface="+mn-cs"/>
               </a:rPr>
-              <a:t>The top row of the lower panel (</a:t>
+              <a:t>c.) Influence of leaf traits on photosynthetic protein </a:t>
+            </a:r>
+            <a:r>
+              <a:rPr lang="en-AU" sz="1680" kern="1200" dirty="0" smtClean="0">
+                <a:solidFill>
+                  <a:schemeClr val="tx1"/>
+                </a:solidFill>
+                <a:effectLst/>
+                <a:latin typeface="+mn-lt"/>
+                <a:ea typeface="+mn-ea"/>
+                <a:cs typeface="+mn-cs"/>
+              </a:rPr>
+              <a:t>abundance.</a:t>
+            </a:r>
+            <a:r>
+              <a:rPr lang="en-AU" sz="1680" kern="1200" baseline="0" dirty="0" smtClean="0">
+                <a:solidFill>
+                  <a:schemeClr val="tx1"/>
+                </a:solidFill>
+                <a:effectLst/>
+                <a:latin typeface="+mn-lt"/>
+                <a:ea typeface="+mn-ea"/>
+                <a:cs typeface="+mn-cs"/>
+              </a:rPr>
+              <a:t> </a:t>
+            </a:r>
+            <a:r>
+              <a:rPr lang="en-AU" sz="1680" kern="1200" dirty="0" smtClean="0">
+                <a:solidFill>
+                  <a:schemeClr val="tx1"/>
+                </a:solidFill>
+                <a:effectLst/>
+                <a:latin typeface="+mn-lt"/>
+                <a:ea typeface="+mn-ea"/>
+                <a:cs typeface="+mn-cs"/>
+              </a:rPr>
+              <a:t>Trends in abundance of photosystem proteins [symbol, colour] and Calvin cycle enzymes [symbol, colour] are shown in relation to: </a:t>
             </a:r>
             <a:r>
               <a:rPr lang="en-AU" sz="1680" kern="1200" dirty="0" err="1" smtClean="0">
@@ -1471,7 +1583,7 @@
                 <a:ea typeface="+mn-ea"/>
                 <a:cs typeface="+mn-cs"/>
               </a:rPr>
-              <a:t>i</a:t>
+              <a:t>i,ii</a:t>
             </a:r>
             <a:r>
               <a:rPr lang="en-AU" sz="1680" kern="1200" dirty="0" smtClean="0">
@@ -1483,10 +1595,116 @@
                 <a:ea typeface="+mn-ea"/>
                 <a:cs typeface="+mn-cs"/>
               </a:rPr>
-              <a:t>, iii, v) shows models fit using protein abundances expressed on a proportional basis; the bottom row (ii, iv, vi,) shows models fit using protein abundances expressed on a per leaf area basis (mg protein / m2 leaf area). </a:t>
-            </a:r>
-          </a:p>
-          <a:p>
+              <a:t>.) total leaf protein</a:t>
+            </a:r>
+            <a:r>
+              <a:rPr lang="en-AU" sz="1680" kern="1200" baseline="0" dirty="0" smtClean="0">
+                <a:solidFill>
+                  <a:schemeClr val="tx1"/>
+                </a:solidFill>
+                <a:effectLst/>
+                <a:latin typeface="+mn-lt"/>
+                <a:ea typeface="+mn-ea"/>
+                <a:cs typeface="+mn-cs"/>
+              </a:rPr>
+              <a:t> per leaf area (mg/m2)</a:t>
+            </a:r>
+            <a:r>
+              <a:rPr lang="en-AU" sz="1680" kern="1200" dirty="0" smtClean="0">
+                <a:solidFill>
+                  <a:schemeClr val="tx1"/>
+                </a:solidFill>
+                <a:effectLst/>
+                <a:latin typeface="+mn-lt"/>
+                <a:ea typeface="+mn-ea"/>
+                <a:cs typeface="+mn-cs"/>
+              </a:rPr>
+              <a:t>, R2 = , modelled change (%) = , p = ; </a:t>
+            </a:r>
+            <a:r>
+              <a:rPr lang="en-AU" sz="1680" kern="1200" dirty="0" err="1" smtClean="0">
+                <a:solidFill>
+                  <a:schemeClr val="tx1"/>
+                </a:solidFill>
+                <a:effectLst/>
+                <a:latin typeface="+mn-lt"/>
+                <a:ea typeface="+mn-ea"/>
+                <a:cs typeface="+mn-cs"/>
+              </a:rPr>
+              <a:t>iii,iv</a:t>
+            </a:r>
+            <a:r>
+              <a:rPr lang="en-AU" sz="1680" kern="1200" dirty="0" smtClean="0">
+                <a:solidFill>
+                  <a:schemeClr val="tx1"/>
+                </a:solidFill>
+                <a:effectLst/>
+                <a:latin typeface="+mn-lt"/>
+                <a:ea typeface="+mn-ea"/>
+                <a:cs typeface="+mn-cs"/>
+              </a:rPr>
+              <a:t>.) leaf</a:t>
+            </a:r>
+            <a:r>
+              <a:rPr lang="en-AU" sz="1680" kern="1200" baseline="0" dirty="0" smtClean="0">
+                <a:solidFill>
+                  <a:schemeClr val="tx1"/>
+                </a:solidFill>
+                <a:effectLst/>
+                <a:latin typeface="+mn-lt"/>
+                <a:ea typeface="+mn-ea"/>
+                <a:cs typeface="+mn-cs"/>
+              </a:rPr>
+              <a:t> mass per area (g/m2),</a:t>
+            </a:r>
+            <a:r>
+              <a:rPr lang="en-AU" sz="1680" kern="1200" dirty="0" smtClean="0">
+                <a:solidFill>
+                  <a:schemeClr val="tx1"/>
+                </a:solidFill>
+                <a:effectLst/>
+                <a:latin typeface="+mn-lt"/>
+                <a:ea typeface="+mn-ea"/>
+                <a:cs typeface="+mn-cs"/>
+              </a:rPr>
+              <a:t> R2 = , modelled change (%) = , p = .</a:t>
+            </a:r>
+            <a:r>
+              <a:rPr lang="en-AU" sz="1680" kern="1200" baseline="0" dirty="0" smtClean="0">
+                <a:solidFill>
+                  <a:schemeClr val="tx1"/>
+                </a:solidFill>
+                <a:effectLst/>
+                <a:latin typeface="+mn-lt"/>
+                <a:ea typeface="+mn-ea"/>
+                <a:cs typeface="+mn-cs"/>
+              </a:rPr>
+              <a:t> Plot details are as described in Fig. </a:t>
+            </a:r>
+            <a:r>
+              <a:rPr lang="en-AU" sz="1680" kern="1200" baseline="0" dirty="0" err="1" smtClean="0">
+                <a:solidFill>
+                  <a:schemeClr val="tx1"/>
+                </a:solidFill>
+                <a:effectLst/>
+                <a:latin typeface="+mn-lt"/>
+                <a:ea typeface="+mn-ea"/>
+                <a:cs typeface="+mn-cs"/>
+              </a:rPr>
+              <a:t>Xb</a:t>
+            </a:r>
+            <a:r>
+              <a:rPr lang="en-AU" sz="1680" kern="1200" baseline="0" dirty="0" smtClean="0">
+                <a:solidFill>
+                  <a:schemeClr val="tx1"/>
+                </a:solidFill>
+                <a:effectLst/>
+                <a:latin typeface="+mn-lt"/>
+                <a:ea typeface="+mn-ea"/>
+                <a:cs typeface="+mn-cs"/>
+              </a:rPr>
+              <a:t>.</a:t>
+            </a:r>
             <a:endParaRPr lang="en-AU" sz="1680" kern="1200" dirty="0" smtClean="0">
               <a:solidFill>
                 <a:schemeClr val="tx1"/>
@@ -1498,20 +1716,6 @@
             </a:endParaRPr>
           </a:p>
           <a:p>
-            <a:r>
-              <a:rPr lang="en-AU" sz="1680" kern="1200" dirty="0" smtClean="0">
-                <a:solidFill>
-                  <a:schemeClr val="tx1"/>
-                </a:solidFill>
-                <a:effectLst/>
-                <a:latin typeface="+mn-lt"/>
-                <a:ea typeface="+mn-ea"/>
-                <a:cs typeface="+mn-cs"/>
-              </a:rPr>
-              <a:t>c.) Influence of leaf traits on photosynthetic protein abundance: </a:t>
-            </a:r>
-          </a:p>
-          <a:p>
             <a:endParaRPr lang="en-AU" sz="1680" kern="1200" dirty="0" smtClean="0">
               <a:solidFill>
                 <a:schemeClr val="tx1"/>
@@ -1524,18 +1728,6 @@
           </a:p>
           <a:p>
             <a:r>
-              <a:rPr lang="en-AU" sz="1680" kern="1200" dirty="0" err="1" smtClean="0">
-                <a:solidFill>
-                  <a:schemeClr val="tx1"/>
-                </a:solidFill>
-                <a:effectLst/>
-                <a:latin typeface="+mn-lt"/>
-                <a:ea typeface="+mn-ea"/>
-                <a:cs typeface="+mn-cs"/>
-              </a:rPr>
-              <a:t>i</a:t>
-            </a:r>
-            <a:r>
               <a:rPr lang="en-AU" sz="1680" kern="1200" dirty="0" smtClean="0">
                 <a:solidFill>
                   <a:schemeClr val="tx1"/>
@@ -1545,7 +1737,7 @@
                 <a:ea typeface="+mn-ea"/>
                 <a:cs typeface="+mn-cs"/>
               </a:rPr>
-              <a:t>.) Neither photosystems nor Calvin cycle enzymes change proportionally in response to total leaf protein, p = , R2 = ; ii.) on a per leaf area basis, abundances of both functional categories strongly track leaf total protein, although there is more variation associated with photosystem protein abundances than Calvin cycle protein abundances. iii.) Proportional abundance of photosystem proteins declines as leaf mass per area (LMA, g/m2) increases (R2 = , p = ), but no such trend is apparent for Calvin cycle proteins (p = , R2 = ); iv.) On a per leaf area basis, abundance of Calvin cycle proteins increases with LMA (R2 =, p  = ), while photosystem protein abundance does not change (R2 = , p = ). </a:t>
+              <a:t>d.) Multiple regression models visualised using coloration to indicate the modelled magnitude of protein abundance in two-dimensional environmental space. Curved contours indicate significant interaction effects between predictors. A full table of multiple regression statistics is presented in the supplementary materials.</a:t>
             </a:r>
           </a:p>
           <a:p>
@@ -1561,6 +1753,18 @@
           </a:p>
           <a:p>
             <a:r>
+              <a:rPr lang="en-AU" sz="1680" kern="1200" dirty="0" err="1" smtClean="0">
+                <a:solidFill>
+                  <a:schemeClr val="tx1"/>
+                </a:solidFill>
+                <a:effectLst/>
+                <a:latin typeface="+mn-lt"/>
+                <a:ea typeface="+mn-ea"/>
+                <a:cs typeface="+mn-cs"/>
+              </a:rPr>
+              <a:t>i</a:t>
+            </a:r>
+            <a:r>
               <a:rPr lang="en-AU" sz="1680" kern="1200" dirty="0" smtClean="0">
                 <a:solidFill>
                   <a:schemeClr val="tx1"/>
@@ -1570,7 +1774,68 @@
                 <a:ea typeface="+mn-ea"/>
                 <a:cs typeface="+mn-cs"/>
               </a:rPr>
-              <a:t>d.) Multiple regression models visualised using coloration to indicate the modelled magnitude of protein abundance in two-dimensional environmental space. Curved contours indicate significant interaction effects between predictors. A full table of multiple regression statistics is presented in the supplementary materials.</a:t>
+              <a:t>.) Proportional abundance of photosystem proteins modelled by MAT and incident irradiance (adjusted multiple R2 (adj.R2) =  , p(interaction) = , etc</a:t>
+            </a:r>
+            <a:r>
+              <a:rPr lang="en-AU" sz="1680" kern="1200" dirty="0" smtClean="0">
+                <a:solidFill>
+                  <a:schemeClr val="tx1"/>
+                </a:solidFill>
+                <a:effectLst/>
+                <a:latin typeface="+mn-lt"/>
+                <a:ea typeface="+mn-ea"/>
+                <a:cs typeface="+mn-cs"/>
+              </a:rPr>
+              <a:t>.);</a:t>
+            </a:r>
+          </a:p>
+          <a:p>
+            <a:endParaRPr lang="en-AU" sz="1680" kern="1200" baseline="0" dirty="0" smtClean="0">
+              <a:solidFill>
+                <a:schemeClr val="tx1"/>
+              </a:solidFill>
+              <a:effectLst/>
+              <a:latin typeface="+mn-lt"/>
+              <a:ea typeface="+mn-ea"/>
+              <a:cs typeface="+mn-cs"/>
+            </a:endParaRPr>
+          </a:p>
+          <a:p>
+            <a:r>
+              <a:rPr lang="en-AU" sz="1680" kern="1200" dirty="0" smtClean="0">
+                <a:solidFill>
+                  <a:schemeClr val="tx1"/>
+                </a:solidFill>
+                <a:effectLst/>
+                <a:latin typeface="+mn-lt"/>
+                <a:ea typeface="+mn-ea"/>
+                <a:cs typeface="+mn-cs"/>
+              </a:rPr>
+              <a:t>ii</a:t>
+            </a:r>
+            <a:r>
+              <a:rPr lang="en-AU" sz="1680" kern="1200" dirty="0" smtClean="0">
+                <a:solidFill>
+                  <a:schemeClr val="tx1"/>
+                </a:solidFill>
+                <a:effectLst/>
+                <a:latin typeface="+mn-lt"/>
+                <a:ea typeface="+mn-ea"/>
+                <a:cs typeface="+mn-cs"/>
+              </a:rPr>
+              <a:t>.) Per leaf area abundance of photosystems proteins (PS(area)) modelled by MAT and MAP (adjusted multiple R2 (adj.R2) =  , p(interaction) = , etc</a:t>
+            </a:r>
+            <a:r>
+              <a:rPr lang="en-AU" sz="1680" kern="1200" dirty="0" smtClean="0">
+                <a:solidFill>
+                  <a:schemeClr val="tx1"/>
+                </a:solidFill>
+                <a:effectLst/>
+                <a:latin typeface="+mn-lt"/>
+                <a:ea typeface="+mn-ea"/>
+                <a:cs typeface="+mn-cs"/>
+              </a:rPr>
+              <a:t>.);</a:t>
             </a:r>
           </a:p>
           <a:p>
@@ -1586,6 +1851,30 @@
           </a:p>
           <a:p>
             <a:r>
+              <a:rPr lang="en-AU" sz="1680" kern="1200" dirty="0" smtClean="0">
+                <a:solidFill>
+                  <a:schemeClr val="tx1"/>
+                </a:solidFill>
+                <a:effectLst/>
+                <a:latin typeface="+mn-lt"/>
+                <a:ea typeface="+mn-ea"/>
+                <a:cs typeface="+mn-cs"/>
+              </a:rPr>
+              <a:t>iii</a:t>
+            </a:r>
+            <a:r>
+              <a:rPr lang="en-AU" sz="1680" kern="1200" dirty="0" smtClean="0">
+                <a:solidFill>
+                  <a:schemeClr val="tx1"/>
+                </a:solidFill>
+                <a:effectLst/>
+                <a:latin typeface="+mn-lt"/>
+                <a:ea typeface="+mn-ea"/>
+                <a:cs typeface="+mn-cs"/>
+              </a:rPr>
+              <a:t>.) Proportional abundance of Calvin cycle proteins (</a:t>
+            </a:r>
+            <a:r>
               <a:rPr lang="en-AU" sz="1680" kern="1200" dirty="0" err="1" smtClean="0">
                 <a:solidFill>
                   <a:schemeClr val="tx1"/>
@@ -1595,7 +1884,7 @@
                 <a:ea typeface="+mn-ea"/>
                 <a:cs typeface="+mn-cs"/>
               </a:rPr>
-              <a:t>i</a:t>
+              <a:t>Calv</a:t>
             </a:r>
             <a:r>
               <a:rPr lang="en-AU" sz="1680" kern="1200" dirty="0" smtClean="0">
@@ -1607,10 +1896,8 @@
                 <a:ea typeface="+mn-ea"/>
                 <a:cs typeface="+mn-cs"/>
               </a:rPr>
-              <a:t>.) Proportional abundance of photosystem proteins modelled by MAT and incident irradiance (adjusted multiple R2 (adj.R2) =  , p(interaction) = , etc.). The strong univariate relationship between photosystem proportional abundance (PS(prop)) and incident irradiance is modulated by MAT. At warm sites, PS(prop) follows our expectations and is highest at warm high irradiance sites, and lowest at warm low irradiance sites. No relationship between irradiance and PS(prop) is apparent at cool sites, however.</a:t>
-            </a:r>
-          </a:p>
-          <a:p>
+              <a:t>(prop))modelled by MAT and incident irradiance (adjusted multiple R2 (adj.R2) =  , p(interaction) = , etc</a:t>
+            </a:r>
             <a:r>
               <a:rPr lang="en-AU" sz="1680" kern="1200" dirty="0" smtClean="0">
                 <a:solidFill>
@@ -1621,8 +1908,19 @@
                 <a:ea typeface="+mn-ea"/>
                 <a:cs typeface="+mn-cs"/>
               </a:rPr>
-              <a:t>ii.) Per leaf area abundance of photosystems proteins (PS(area)) modelled by MAT and MAP (adjusted multiple R2 (adj.R2) =  , p(interaction) = , etc.).  MAP and MAT interactively explain variation in PS(area), and a univariate relationship between PS(area) and MAP is only apparent at cool sites. This effect may result from the strong influence of temperature on total leaf protein concentration. </a:t>
-            </a:r>
+              <a:t>.);</a:t>
+            </a:r>
+          </a:p>
+          <a:p>
+            <a:endParaRPr lang="en-AU" sz="1680" kern="1200" dirty="0" smtClean="0">
+              <a:solidFill>
+                <a:schemeClr val="tx1"/>
+              </a:solidFill>
+              <a:effectLst/>
+              <a:latin typeface="+mn-lt"/>
+              <a:ea typeface="+mn-ea"/>
+              <a:cs typeface="+mn-cs"/>
+            </a:endParaRPr>
           </a:p>
           <a:p>
             <a:r>
@@ -1635,7 +1933,7 @@
                 <a:ea typeface="+mn-ea"/>
                 <a:cs typeface="+mn-cs"/>
               </a:rPr>
-              <a:t>iii.) Proportional abundance of Calvin cycle proteins (</a:t>
+              <a:t>iv.) Per leaf area abundance of Calvin cycle proteins (</a:t>
             </a:r>
             <a:r>
               <a:rPr lang="en-AU" sz="1680" kern="1200" dirty="0" err="1" smtClean="0">
@@ -1659,19 +1957,7 @@
                 <a:ea typeface="+mn-ea"/>
                 <a:cs typeface="+mn-cs"/>
               </a:rPr>
-              <a:t>(prop))modelled by MAT and incident irradiance (adjusted multiple R2 (adj.R2) =  , p(interaction) = , etc.). </a:t>
-            </a:r>
-            <a:r>
-              <a:rPr lang="en-AU" sz="1680" kern="1200" dirty="0" err="1" smtClean="0">
-                <a:solidFill>
-                  <a:schemeClr val="tx1"/>
-                </a:solidFill>
-                <a:effectLst/>
-                <a:latin typeface="+mn-lt"/>
-                <a:ea typeface="+mn-ea"/>
-                <a:cs typeface="+mn-cs"/>
-              </a:rPr>
-              <a:t>Calv</a:t>
+              <a:t>(area)) modelled by MAT and MAP (adjusted multiple R2 (adj.R2) =  , p(interaction) = , etc</a:t>
             </a:r>
             <a:r>
               <a:rPr lang="en-AU" sz="1680" kern="1200" dirty="0" smtClean="0">
@@ -1683,118 +1969,17 @@
                 <a:ea typeface="+mn-ea"/>
                 <a:cs typeface="+mn-cs"/>
               </a:rPr>
-              <a:t>(prop) is related to MAT and MAP by a simple additive relationship, similar in nature to and likely not independent of MAP/MAT influence on total leaf protein (Fig 1e) .</a:t>
-            </a:r>
-          </a:p>
-          <a:p>
-            <a:r>
-              <a:rPr lang="en-AU" sz="1680" kern="1200" dirty="0" smtClean="0">
-                <a:solidFill>
-                  <a:schemeClr val="tx1"/>
-                </a:solidFill>
-                <a:effectLst/>
-                <a:latin typeface="+mn-lt"/>
-                <a:ea typeface="+mn-ea"/>
-                <a:cs typeface="+mn-cs"/>
-              </a:rPr>
-              <a:t>iv.) Per leaf area abundance of Calvin cycle proteins (</a:t>
-            </a:r>
-            <a:r>
-              <a:rPr lang="en-AU" sz="1680" kern="1200" dirty="0" err="1" smtClean="0">
-                <a:solidFill>
-                  <a:schemeClr val="tx1"/>
-                </a:solidFill>
-                <a:effectLst/>
-                <a:latin typeface="+mn-lt"/>
-                <a:ea typeface="+mn-ea"/>
-                <a:cs typeface="+mn-cs"/>
-              </a:rPr>
-              <a:t>Calv</a:t>
-            </a:r>
-            <a:r>
-              <a:rPr lang="en-AU" sz="1680" kern="1200" dirty="0" smtClean="0">
-                <a:solidFill>
-                  <a:schemeClr val="tx1"/>
-                </a:solidFill>
-                <a:effectLst/>
-                <a:latin typeface="+mn-lt"/>
-                <a:ea typeface="+mn-ea"/>
-                <a:cs typeface="+mn-cs"/>
-              </a:rPr>
-              <a:t>(area)) modelled by MAT and MAP (adjusted multiple R2 (adj.R2) =  , p(interaction) = , etc.).  </a:t>
-            </a:r>
-            <a:r>
-              <a:rPr lang="en-AU" sz="1680" kern="1200" dirty="0" err="1" smtClean="0">
-                <a:solidFill>
-                  <a:schemeClr val="tx1"/>
-                </a:solidFill>
-                <a:effectLst/>
-                <a:latin typeface="+mn-lt"/>
-                <a:ea typeface="+mn-ea"/>
-                <a:cs typeface="+mn-cs"/>
-              </a:rPr>
-              <a:t>Calv</a:t>
-            </a:r>
-            <a:r>
-              <a:rPr lang="en-AU" sz="1680" kern="1200" dirty="0" smtClean="0">
-                <a:solidFill>
-                  <a:schemeClr val="tx1"/>
-                </a:solidFill>
-                <a:effectLst/>
-                <a:latin typeface="+mn-lt"/>
-                <a:ea typeface="+mn-ea"/>
-                <a:cs typeface="+mn-cs"/>
-              </a:rPr>
-              <a:t>(area) is interactively related to incident irradiance and MAT: high temperature, high irradiance sites are associated with the highest </a:t>
-            </a:r>
-            <a:r>
-              <a:rPr lang="en-AU" sz="1680" kern="1200" dirty="0" err="1" smtClean="0">
-                <a:solidFill>
-                  <a:schemeClr val="tx1"/>
-                </a:solidFill>
-                <a:effectLst/>
-                <a:latin typeface="+mn-lt"/>
-                <a:ea typeface="+mn-ea"/>
-                <a:cs typeface="+mn-cs"/>
-              </a:rPr>
-              <a:t>Calv</a:t>
-            </a:r>
-            <a:r>
-              <a:rPr lang="en-AU" sz="1680" kern="1200" dirty="0" smtClean="0">
-                <a:solidFill>
-                  <a:schemeClr val="tx1"/>
-                </a:solidFill>
-                <a:effectLst/>
-                <a:latin typeface="+mn-lt"/>
-                <a:ea typeface="+mn-ea"/>
-                <a:cs typeface="+mn-cs"/>
-              </a:rPr>
-              <a:t>(area), while at low temperatures, higher irradiance predicts lower </a:t>
-            </a:r>
-            <a:r>
-              <a:rPr lang="en-AU" sz="1680" kern="1200" dirty="0" err="1" smtClean="0">
-                <a:solidFill>
-                  <a:schemeClr val="tx1"/>
-                </a:solidFill>
-                <a:effectLst/>
-                <a:latin typeface="+mn-lt"/>
-                <a:ea typeface="+mn-ea"/>
-                <a:cs typeface="+mn-cs"/>
-              </a:rPr>
-              <a:t>Calv</a:t>
-            </a:r>
-            <a:r>
-              <a:rPr lang="en-AU" sz="1680" kern="1200" dirty="0" smtClean="0">
-                <a:solidFill>
-                  <a:schemeClr val="tx1"/>
-                </a:solidFill>
-                <a:effectLst/>
-                <a:latin typeface="+mn-lt"/>
-                <a:ea typeface="+mn-ea"/>
-                <a:cs typeface="+mn-cs"/>
-              </a:rPr>
-              <a:t>(area). Care should be taken in interpretation here, however, as there were few low temperature sites with high incident irradiance to inform the model.</a:t>
-            </a:r>
+              <a:t>.).</a:t>
+            </a:r>
+            <a:endParaRPr lang="en-AU" sz="1680" kern="1200" dirty="0" smtClean="0">
+              <a:solidFill>
+                <a:schemeClr val="tx1"/>
+              </a:solidFill>
+              <a:effectLst/>
+              <a:latin typeface="+mn-lt"/>
+              <a:ea typeface="+mn-ea"/>
+              <a:cs typeface="+mn-cs"/>
+            </a:endParaRPr>
           </a:p>
           <a:p>
             <a:pPr marL="0" marR="0" lvl="0" indent="0" algn="l" defTabSz="914400" rtl="0" eaLnBrk="1" fontAlgn="auto" latinLnBrk="0" hangingPunct="1">
@@ -1985,7 +2170,7 @@
           <a:p>
             <a:fld id="{D0D04FFC-C665-4B75-ABA2-871BBC76FE3C}" type="datetimeFigureOut">
               <a:rPr lang="en-AU" smtClean="0"/>
-              <a:t>24/04/2018</a:t>
+              <a:t>8/05/2018</a:t>
             </a:fld>
             <a:endParaRPr lang="en-AU"/>
           </a:p>
@@ -2155,7 +2340,7 @@
           <a:p>
             <a:fld id="{D0D04FFC-C665-4B75-ABA2-871BBC76FE3C}" type="datetimeFigureOut">
               <a:rPr lang="en-AU" smtClean="0"/>
-              <a:t>24/04/2018</a:t>
+              <a:t>8/05/2018</a:t>
             </a:fld>
             <a:endParaRPr lang="en-AU"/>
           </a:p>
@@ -2335,7 +2520,7 @@
           <a:p>
             <a:fld id="{D0D04FFC-C665-4B75-ABA2-871BBC76FE3C}" type="datetimeFigureOut">
               <a:rPr lang="en-AU" smtClean="0"/>
-              <a:t>24/04/2018</a:t>
+              <a:t>8/05/2018</a:t>
             </a:fld>
             <a:endParaRPr lang="en-AU"/>
           </a:p>
@@ -2505,7 +2690,7 @@
           <a:p>
             <a:fld id="{D0D04FFC-C665-4B75-ABA2-871BBC76FE3C}" type="datetimeFigureOut">
               <a:rPr lang="en-AU" smtClean="0"/>
-              <a:t>24/04/2018</a:t>
+              <a:t>8/05/2018</a:t>
             </a:fld>
             <a:endParaRPr lang="en-AU"/>
           </a:p>
@@ -2751,7 +2936,7 @@
           <a:p>
             <a:fld id="{D0D04FFC-C665-4B75-ABA2-871BBC76FE3C}" type="datetimeFigureOut">
               <a:rPr lang="en-AU" smtClean="0"/>
-              <a:t>24/04/2018</a:t>
+              <a:t>8/05/2018</a:t>
             </a:fld>
             <a:endParaRPr lang="en-AU"/>
           </a:p>
@@ -2983,7 +3168,7 @@
           <a:p>
             <a:fld id="{D0D04FFC-C665-4B75-ABA2-871BBC76FE3C}" type="datetimeFigureOut">
               <a:rPr lang="en-AU" smtClean="0"/>
-              <a:t>24/04/2018</a:t>
+              <a:t>8/05/2018</a:t>
             </a:fld>
             <a:endParaRPr lang="en-AU"/>
           </a:p>
@@ -3350,7 +3535,7 @@
           <a:p>
             <a:fld id="{D0D04FFC-C665-4B75-ABA2-871BBC76FE3C}" type="datetimeFigureOut">
               <a:rPr lang="en-AU" smtClean="0"/>
-              <a:t>24/04/2018</a:t>
+              <a:t>8/05/2018</a:t>
             </a:fld>
             <a:endParaRPr lang="en-AU"/>
           </a:p>
@@ -3468,7 +3653,7 @@
           <a:p>
             <a:fld id="{D0D04FFC-C665-4B75-ABA2-871BBC76FE3C}" type="datetimeFigureOut">
               <a:rPr lang="en-AU" smtClean="0"/>
-              <a:t>24/04/2018</a:t>
+              <a:t>8/05/2018</a:t>
             </a:fld>
             <a:endParaRPr lang="en-AU"/>
           </a:p>
@@ -3563,7 +3748,7 @@
           <a:p>
             <a:fld id="{D0D04FFC-C665-4B75-ABA2-871BBC76FE3C}" type="datetimeFigureOut">
               <a:rPr lang="en-AU" smtClean="0"/>
-              <a:t>24/04/2018</a:t>
+              <a:t>8/05/2018</a:t>
             </a:fld>
             <a:endParaRPr lang="en-AU"/>
           </a:p>
@@ -3840,7 +4025,7 @@
           <a:p>
             <a:fld id="{D0D04FFC-C665-4B75-ABA2-871BBC76FE3C}" type="datetimeFigureOut">
               <a:rPr lang="en-AU" smtClean="0"/>
-              <a:t>24/04/2018</a:t>
+              <a:t>8/05/2018</a:t>
             </a:fld>
             <a:endParaRPr lang="en-AU"/>
           </a:p>
@@ -4093,7 +4278,7 @@
           <a:p>
             <a:fld id="{D0D04FFC-C665-4B75-ABA2-871BBC76FE3C}" type="datetimeFigureOut">
               <a:rPr lang="en-AU" smtClean="0"/>
-              <a:t>24/04/2018</a:t>
+              <a:t>8/05/2018</a:t>
             </a:fld>
             <a:endParaRPr lang="en-AU"/>
           </a:p>
@@ -4306,7 +4491,7 @@
           <a:p>
             <a:fld id="{D0D04FFC-C665-4B75-ABA2-871BBC76FE3C}" type="datetimeFigureOut">
               <a:rPr lang="en-AU" smtClean="0"/>
-              <a:t>24/04/2018</a:t>
+              <a:t>8/05/2018</a:t>
             </a:fld>
             <a:endParaRPr lang="en-AU"/>
           </a:p>
@@ -5457,656 +5642,6 @@
       </p:pic>
       <p:pic>
         <p:nvPicPr>
-          <p:cNvPr id="55" name="Picture 54"/>
-          <p:cNvPicPr>
-            <a:picLocks noChangeAspect="1"/>
-          </p:cNvPicPr>
-          <p:nvPr/>
-        </p:nvPicPr>
-        <p:blipFill>
-          <a:blip r:embed="rId4" cstate="print">
-            <a:extLst>
-              <a:ext uri="{28A0092B-C50C-407E-A947-70E740481C1C}">
-                <a14:useLocalDpi xmlns:a14="http://schemas.microsoft.com/office/drawing/2010/main" val="0"/>
-              </a:ext>
-            </a:extLst>
-          </a:blip>
-          <a:stretch>
-            <a:fillRect/>
-          </a:stretch>
-        </p:blipFill>
-        <p:spPr>
-          <a:xfrm>
-            <a:off x="3698645" y="3661838"/>
-            <a:ext cx="909195" cy="804633"/>
-          </a:xfrm>
-          <a:prstGeom prst="rect">
-            <a:avLst/>
-          </a:prstGeom>
-        </p:spPr>
-      </p:pic>
-      <p:pic>
-        <p:nvPicPr>
-          <p:cNvPr id="56" name="Picture 55"/>
-          <p:cNvPicPr>
-            <a:picLocks noChangeAspect="1"/>
-          </p:cNvPicPr>
-          <p:nvPr/>
-        </p:nvPicPr>
-        <p:blipFill>
-          <a:blip r:embed="rId5" cstate="print">
-            <a:extLst>
-              <a:ext uri="{28A0092B-C50C-407E-A947-70E740481C1C}">
-                <a14:useLocalDpi xmlns:a14="http://schemas.microsoft.com/office/drawing/2010/main" val="0"/>
-              </a:ext>
-            </a:extLst>
-          </a:blip>
-          <a:stretch>
-            <a:fillRect/>
-          </a:stretch>
-        </p:blipFill>
-        <p:spPr>
-          <a:xfrm>
-            <a:off x="3749858" y="4497957"/>
-            <a:ext cx="909195" cy="804633"/>
-          </a:xfrm>
-          <a:prstGeom prst="rect">
-            <a:avLst/>
-          </a:prstGeom>
-        </p:spPr>
-      </p:pic>
-      <p:pic>
-        <p:nvPicPr>
-          <p:cNvPr id="59" name="Picture 58"/>
-          <p:cNvPicPr>
-            <a:picLocks noChangeAspect="1"/>
-          </p:cNvPicPr>
-          <p:nvPr/>
-        </p:nvPicPr>
-        <p:blipFill>
-          <a:blip r:embed="rId6" cstate="print">
-            <a:extLst>
-              <a:ext uri="{28A0092B-C50C-407E-A947-70E740481C1C}">
-                <a14:useLocalDpi xmlns:a14="http://schemas.microsoft.com/office/drawing/2010/main" val="0"/>
-              </a:ext>
-            </a:extLst>
-          </a:blip>
-          <a:stretch>
-            <a:fillRect/>
-          </a:stretch>
-        </p:blipFill>
-        <p:spPr>
-          <a:xfrm>
-            <a:off x="4599082" y="3661838"/>
-            <a:ext cx="909195" cy="804633"/>
-          </a:xfrm>
-          <a:prstGeom prst="rect">
-            <a:avLst/>
-          </a:prstGeom>
-        </p:spPr>
-      </p:pic>
-      <p:pic>
-        <p:nvPicPr>
-          <p:cNvPr id="60" name="Picture 59"/>
-          <p:cNvPicPr>
-            <a:picLocks noChangeAspect="1"/>
-          </p:cNvPicPr>
-          <p:nvPr/>
-        </p:nvPicPr>
-        <p:blipFill>
-          <a:blip r:embed="rId7" cstate="print">
-            <a:extLst>
-              <a:ext uri="{28A0092B-C50C-407E-A947-70E740481C1C}">
-                <a14:useLocalDpi xmlns:a14="http://schemas.microsoft.com/office/drawing/2010/main" val="0"/>
-              </a:ext>
-            </a:extLst>
-          </a:blip>
-          <a:stretch>
-            <a:fillRect/>
-          </a:stretch>
-        </p:blipFill>
-        <p:spPr>
-          <a:xfrm>
-            <a:off x="4650295" y="4497740"/>
-            <a:ext cx="909195" cy="804633"/>
-          </a:xfrm>
-          <a:prstGeom prst="rect">
-            <a:avLst/>
-          </a:prstGeom>
-        </p:spPr>
-      </p:pic>
-      <p:pic>
-        <p:nvPicPr>
-          <p:cNvPr id="61" name="Picture 60"/>
-          <p:cNvPicPr>
-            <a:picLocks noChangeAspect="1"/>
-          </p:cNvPicPr>
-          <p:nvPr/>
-        </p:nvPicPr>
-        <p:blipFill>
-          <a:blip r:embed="rId8" cstate="print">
-            <a:extLst>
-              <a:ext uri="{28A0092B-C50C-407E-A947-70E740481C1C}">
-                <a14:useLocalDpi xmlns:a14="http://schemas.microsoft.com/office/drawing/2010/main" val="0"/>
-              </a:ext>
-            </a:extLst>
-          </a:blip>
-          <a:stretch>
-            <a:fillRect/>
-          </a:stretch>
-        </p:blipFill>
-        <p:spPr>
-          <a:xfrm>
-            <a:off x="5480691" y="3661621"/>
-            <a:ext cx="909195" cy="804633"/>
-          </a:xfrm>
-          <a:prstGeom prst="rect">
-            <a:avLst/>
-          </a:prstGeom>
-        </p:spPr>
-      </p:pic>
-      <p:pic>
-        <p:nvPicPr>
-          <p:cNvPr id="62" name="Picture 61"/>
-          <p:cNvPicPr>
-            <a:picLocks noChangeAspect="1"/>
-          </p:cNvPicPr>
-          <p:nvPr/>
-        </p:nvPicPr>
-        <p:blipFill>
-          <a:blip r:embed="rId9" cstate="print">
-            <a:extLst>
-              <a:ext uri="{28A0092B-C50C-407E-A947-70E740481C1C}">
-                <a14:useLocalDpi xmlns:a14="http://schemas.microsoft.com/office/drawing/2010/main" val="0"/>
-              </a:ext>
-            </a:extLst>
-          </a:blip>
-          <a:stretch>
-            <a:fillRect/>
-          </a:stretch>
-        </p:blipFill>
-        <p:spPr>
-          <a:xfrm>
-            <a:off x="5519013" y="4511852"/>
-            <a:ext cx="909195" cy="804633"/>
-          </a:xfrm>
-          <a:prstGeom prst="rect">
-            <a:avLst/>
-          </a:prstGeom>
-        </p:spPr>
-      </p:pic>
-      <p:sp>
-        <p:nvSpPr>
-          <p:cNvPr id="67" name="TextBox 66"/>
-          <p:cNvSpPr txBox="1"/>
-          <p:nvPr/>
-        </p:nvSpPr>
-        <p:spPr>
-          <a:xfrm>
-            <a:off x="3816506" y="3577279"/>
-            <a:ext cx="71504" cy="182999"/>
-          </a:xfrm>
-          <a:prstGeom prst="rect">
-            <a:avLst/>
-          </a:prstGeom>
-          <a:noFill/>
-        </p:spPr>
-        <p:txBody>
-          <a:bodyPr wrap="square" rtlCol="0">
-            <a:spAutoFit/>
-          </a:bodyPr>
-          <a:lstStyle/>
-          <a:p>
-            <a:r>
-              <a:rPr lang="en-AU" sz="589" dirty="0" err="1"/>
-              <a:t>i</a:t>
-            </a:r>
-            <a:endParaRPr lang="en-AU" sz="643" dirty="0"/>
-          </a:p>
-        </p:txBody>
-      </p:sp>
-      <p:sp>
-        <p:nvSpPr>
-          <p:cNvPr id="68" name="TextBox 67"/>
-          <p:cNvSpPr txBox="1"/>
-          <p:nvPr/>
-        </p:nvSpPr>
-        <p:spPr>
-          <a:xfrm>
-            <a:off x="4730568" y="3577279"/>
-            <a:ext cx="250262" cy="182999"/>
-          </a:xfrm>
-          <a:prstGeom prst="rect">
-            <a:avLst/>
-          </a:prstGeom>
-          <a:noFill/>
-        </p:spPr>
-        <p:txBody>
-          <a:bodyPr wrap="square" rtlCol="0">
-            <a:spAutoFit/>
-          </a:bodyPr>
-          <a:lstStyle/>
-          <a:p>
-            <a:r>
-              <a:rPr lang="en-AU" sz="589" dirty="0"/>
-              <a:t>iii</a:t>
-            </a:r>
-            <a:endParaRPr lang="en-AU" sz="643" dirty="0"/>
-          </a:p>
-        </p:txBody>
-      </p:sp>
-      <p:sp>
-        <p:nvSpPr>
-          <p:cNvPr id="69" name="TextBox 68"/>
-          <p:cNvSpPr txBox="1"/>
-          <p:nvPr/>
-        </p:nvSpPr>
-        <p:spPr>
-          <a:xfrm>
-            <a:off x="5626184" y="3577279"/>
-            <a:ext cx="197203" cy="182999"/>
-          </a:xfrm>
-          <a:prstGeom prst="rect">
-            <a:avLst/>
-          </a:prstGeom>
-          <a:noFill/>
-        </p:spPr>
-        <p:txBody>
-          <a:bodyPr wrap="square" rtlCol="0">
-            <a:spAutoFit/>
-          </a:bodyPr>
-          <a:lstStyle/>
-          <a:p>
-            <a:r>
-              <a:rPr lang="en-AU" sz="589" dirty="0"/>
-              <a:t>v</a:t>
-            </a:r>
-            <a:endParaRPr lang="en-AU" sz="643" dirty="0"/>
-          </a:p>
-        </p:txBody>
-      </p:sp>
-      <p:sp>
-        <p:nvSpPr>
-          <p:cNvPr id="70" name="TextBox 69"/>
-          <p:cNvSpPr txBox="1"/>
-          <p:nvPr/>
-        </p:nvSpPr>
-        <p:spPr>
-          <a:xfrm>
-            <a:off x="3802294" y="4387897"/>
-            <a:ext cx="148827" cy="273665"/>
-          </a:xfrm>
-          <a:prstGeom prst="rect">
-            <a:avLst/>
-          </a:prstGeom>
-          <a:noFill/>
-        </p:spPr>
-        <p:txBody>
-          <a:bodyPr wrap="square" rtlCol="0">
-            <a:spAutoFit/>
-          </a:bodyPr>
-          <a:lstStyle/>
-          <a:p>
-            <a:r>
-              <a:rPr lang="en-AU" sz="589" dirty="0"/>
-              <a:t>ii</a:t>
-            </a:r>
-            <a:endParaRPr lang="en-AU" sz="643" dirty="0"/>
-          </a:p>
-        </p:txBody>
-      </p:sp>
-      <p:sp>
-        <p:nvSpPr>
-          <p:cNvPr id="71" name="TextBox 70"/>
-          <p:cNvSpPr txBox="1"/>
-          <p:nvPr/>
-        </p:nvSpPr>
-        <p:spPr>
-          <a:xfrm>
-            <a:off x="4698837" y="4387897"/>
-            <a:ext cx="174386" cy="273665"/>
-          </a:xfrm>
-          <a:prstGeom prst="rect">
-            <a:avLst/>
-          </a:prstGeom>
-          <a:noFill/>
-        </p:spPr>
-        <p:txBody>
-          <a:bodyPr wrap="square" rtlCol="0">
-            <a:spAutoFit/>
-          </a:bodyPr>
-          <a:lstStyle/>
-          <a:p>
-            <a:r>
-              <a:rPr lang="en-AU" sz="589" dirty="0"/>
-              <a:t>iv</a:t>
-            </a:r>
-            <a:endParaRPr lang="en-AU" sz="643" dirty="0"/>
-          </a:p>
-        </p:txBody>
-      </p:sp>
-      <p:sp>
-        <p:nvSpPr>
-          <p:cNvPr id="72" name="TextBox 71"/>
-          <p:cNvSpPr txBox="1"/>
-          <p:nvPr/>
-        </p:nvSpPr>
-        <p:spPr>
-          <a:xfrm>
-            <a:off x="5608618" y="4387897"/>
-            <a:ext cx="161148" cy="273665"/>
-          </a:xfrm>
-          <a:prstGeom prst="rect">
-            <a:avLst/>
-          </a:prstGeom>
-          <a:noFill/>
-        </p:spPr>
-        <p:txBody>
-          <a:bodyPr wrap="square" rtlCol="0">
-            <a:spAutoFit/>
-          </a:bodyPr>
-          <a:lstStyle/>
-          <a:p>
-            <a:r>
-              <a:rPr lang="en-AU" sz="589" dirty="0"/>
-              <a:t>vi</a:t>
-            </a:r>
-            <a:endParaRPr lang="en-AU" sz="643" dirty="0"/>
-          </a:p>
-        </p:txBody>
-      </p:sp>
-      <p:grpSp>
-        <p:nvGrpSpPr>
-          <p:cNvPr id="3" name="Group 2"/>
-          <p:cNvGrpSpPr/>
-          <p:nvPr/>
-        </p:nvGrpSpPr>
-        <p:grpSpPr>
-          <a:xfrm>
-            <a:off x="6710856" y="3561364"/>
-            <a:ext cx="1865963" cy="1809779"/>
-            <a:chOff x="5984306" y="7028745"/>
-            <a:chExt cx="3483131" cy="3378254"/>
-          </a:xfrm>
-        </p:grpSpPr>
-        <p:sp>
-          <p:nvSpPr>
-            <p:cNvPr id="39" name="TextBox 38">
-              <a:extLst>
-                <a:ext uri="{FF2B5EF4-FFF2-40B4-BE49-F238E27FC236}">
-                  <a16:creationId xmlns:a16="http://schemas.microsoft.com/office/drawing/2014/main" id="{036694F8-822A-4EA9-A83F-BB11CF14A3AC}"/>
-                </a:ext>
-              </a:extLst>
-            </p:cNvPr>
-            <p:cNvSpPr txBox="1"/>
-            <p:nvPr/>
-          </p:nvSpPr>
-          <p:spPr>
-            <a:xfrm>
-              <a:off x="5984306" y="7028745"/>
-              <a:ext cx="205509" cy="357039"/>
-            </a:xfrm>
-            <a:prstGeom prst="rect">
-              <a:avLst/>
-            </a:prstGeom>
-            <a:noFill/>
-          </p:spPr>
-          <p:txBody>
-            <a:bodyPr wrap="square" rtlCol="0">
-              <a:spAutoFit/>
-            </a:bodyPr>
-            <a:lstStyle/>
-            <a:p>
-              <a:r>
-                <a:rPr lang="en-AU" sz="643" dirty="0"/>
-                <a:t>c</a:t>
-              </a:r>
-            </a:p>
-          </p:txBody>
-        </p:sp>
-        <p:pic>
-          <p:nvPicPr>
-            <p:cNvPr id="57" name="Picture 56"/>
-            <p:cNvPicPr>
-              <a:picLocks noChangeAspect="1"/>
-            </p:cNvPicPr>
-            <p:nvPr/>
-          </p:nvPicPr>
-          <p:blipFill>
-            <a:blip r:embed="rId10" cstate="print">
-              <a:extLst>
-                <a:ext uri="{28A0092B-C50C-407E-A947-70E740481C1C}">
-                  <a14:useLocalDpi xmlns:a14="http://schemas.microsoft.com/office/drawing/2010/main" val="0"/>
-                </a:ext>
-              </a:extLst>
-            </a:blip>
-            <a:stretch>
-              <a:fillRect/>
-            </a:stretch>
-          </p:blipFill>
-          <p:spPr>
-            <a:xfrm>
-              <a:off x="7770273" y="7267005"/>
-              <a:ext cx="1697164" cy="1501981"/>
-            </a:xfrm>
-            <a:prstGeom prst="rect">
-              <a:avLst/>
-            </a:prstGeom>
-          </p:spPr>
-        </p:pic>
-        <p:pic>
-          <p:nvPicPr>
-            <p:cNvPr id="58" name="Picture 57"/>
-            <p:cNvPicPr>
-              <a:picLocks noChangeAspect="1"/>
-            </p:cNvPicPr>
-            <p:nvPr/>
-          </p:nvPicPr>
-          <p:blipFill>
-            <a:blip r:embed="rId11" cstate="print">
-              <a:extLst>
-                <a:ext uri="{28A0092B-C50C-407E-A947-70E740481C1C}">
-                  <a14:useLocalDpi xmlns:a14="http://schemas.microsoft.com/office/drawing/2010/main" val="0"/>
-                </a:ext>
-              </a:extLst>
-            </a:blip>
-            <a:stretch>
-              <a:fillRect/>
-            </a:stretch>
-          </p:blipFill>
-          <p:spPr>
-            <a:xfrm>
-              <a:off x="7766719" y="8905018"/>
-              <a:ext cx="1697164" cy="1501981"/>
-            </a:xfrm>
-            <a:prstGeom prst="rect">
-              <a:avLst/>
-            </a:prstGeom>
-          </p:spPr>
-        </p:pic>
-        <p:pic>
-          <p:nvPicPr>
-            <p:cNvPr id="63" name="Picture 62"/>
-            <p:cNvPicPr>
-              <a:picLocks noChangeAspect="1"/>
-            </p:cNvPicPr>
-            <p:nvPr/>
-          </p:nvPicPr>
-          <p:blipFill>
-            <a:blip r:embed="rId12" cstate="print">
-              <a:extLst>
-                <a:ext uri="{28A0092B-C50C-407E-A947-70E740481C1C}">
-                  <a14:useLocalDpi xmlns:a14="http://schemas.microsoft.com/office/drawing/2010/main" val="0"/>
-                </a:ext>
-              </a:extLst>
-            </a:blip>
-            <a:stretch>
-              <a:fillRect/>
-            </a:stretch>
-          </p:blipFill>
-          <p:spPr>
-            <a:xfrm>
-              <a:off x="6038823" y="7267443"/>
-              <a:ext cx="1697164" cy="1501981"/>
-            </a:xfrm>
-            <a:prstGeom prst="rect">
-              <a:avLst/>
-            </a:prstGeom>
-          </p:spPr>
-        </p:pic>
-        <p:pic>
-          <p:nvPicPr>
-            <p:cNvPr id="64" name="Picture 63"/>
-            <p:cNvPicPr>
-              <a:picLocks noChangeAspect="1"/>
-            </p:cNvPicPr>
-            <p:nvPr/>
-          </p:nvPicPr>
-          <p:blipFill>
-            <a:blip r:embed="rId13" cstate="print">
-              <a:extLst>
-                <a:ext uri="{28A0092B-C50C-407E-A947-70E740481C1C}">
-                  <a14:useLocalDpi xmlns:a14="http://schemas.microsoft.com/office/drawing/2010/main" val="0"/>
-                </a:ext>
-              </a:extLst>
-            </a:blip>
-            <a:stretch>
-              <a:fillRect/>
-            </a:stretch>
-          </p:blipFill>
-          <p:spPr>
-            <a:xfrm>
-              <a:off x="6069555" y="8860668"/>
-              <a:ext cx="1697164" cy="1501981"/>
-            </a:xfrm>
-            <a:prstGeom prst="rect">
-              <a:avLst/>
-            </a:prstGeom>
-          </p:spPr>
-        </p:pic>
-        <p:sp>
-          <p:nvSpPr>
-            <p:cNvPr id="73" name="TextBox 72"/>
-            <p:cNvSpPr txBox="1"/>
-            <p:nvPr/>
-          </p:nvSpPr>
-          <p:spPr>
-            <a:xfrm>
-              <a:off x="6235959" y="7227370"/>
-              <a:ext cx="133474" cy="341598"/>
-            </a:xfrm>
-            <a:prstGeom prst="rect">
-              <a:avLst/>
-            </a:prstGeom>
-            <a:noFill/>
-          </p:spPr>
-          <p:txBody>
-            <a:bodyPr wrap="square" rtlCol="0">
-              <a:spAutoFit/>
-            </a:bodyPr>
-            <a:lstStyle/>
-            <a:p>
-              <a:r>
-                <a:rPr lang="en-AU" sz="589" dirty="0" err="1"/>
-                <a:t>i</a:t>
-              </a:r>
-              <a:endParaRPr lang="en-AU" sz="643" dirty="0"/>
-            </a:p>
-          </p:txBody>
-        </p:sp>
-        <p:sp>
-          <p:nvSpPr>
-            <p:cNvPr id="74" name="TextBox 73"/>
-            <p:cNvSpPr txBox="1"/>
-            <p:nvPr/>
-          </p:nvSpPr>
-          <p:spPr>
-            <a:xfrm>
-              <a:off x="7933123" y="7240985"/>
-              <a:ext cx="368290" cy="680085"/>
-            </a:xfrm>
-            <a:prstGeom prst="rect">
-              <a:avLst/>
-            </a:prstGeom>
-            <a:noFill/>
-          </p:spPr>
-          <p:txBody>
-            <a:bodyPr wrap="square" rtlCol="0">
-              <a:spAutoFit/>
-            </a:bodyPr>
-            <a:lstStyle/>
-            <a:p>
-              <a:r>
-                <a:rPr lang="en-AU" sz="589" dirty="0"/>
-                <a:t>iii</a:t>
-              </a:r>
-              <a:endParaRPr lang="en-AU" sz="643" dirty="0"/>
-            </a:p>
-          </p:txBody>
-        </p:sp>
-        <p:sp>
-          <p:nvSpPr>
-            <p:cNvPr id="75" name="TextBox 74"/>
-            <p:cNvSpPr txBox="1"/>
-            <p:nvPr/>
-          </p:nvSpPr>
-          <p:spPr>
-            <a:xfrm>
-              <a:off x="6206654" y="8606879"/>
-              <a:ext cx="322749" cy="510841"/>
-            </a:xfrm>
-            <a:prstGeom prst="rect">
-              <a:avLst/>
-            </a:prstGeom>
-            <a:noFill/>
-          </p:spPr>
-          <p:txBody>
-            <a:bodyPr wrap="square" rtlCol="0">
-              <a:spAutoFit/>
-            </a:bodyPr>
-            <a:lstStyle/>
-            <a:p>
-              <a:r>
-                <a:rPr lang="en-AU" sz="589" dirty="0"/>
-                <a:t>ii</a:t>
-              </a:r>
-              <a:endParaRPr lang="en-AU" sz="643" dirty="0"/>
-            </a:p>
-          </p:txBody>
-        </p:sp>
-        <p:sp>
-          <p:nvSpPr>
-            <p:cNvPr id="76" name="TextBox 75"/>
-            <p:cNvSpPr txBox="1"/>
-            <p:nvPr/>
-          </p:nvSpPr>
-          <p:spPr>
-            <a:xfrm>
-              <a:off x="7933123" y="8638052"/>
-              <a:ext cx="293444" cy="510841"/>
-            </a:xfrm>
-            <a:prstGeom prst="rect">
-              <a:avLst/>
-            </a:prstGeom>
-            <a:noFill/>
-          </p:spPr>
-          <p:txBody>
-            <a:bodyPr wrap="square" rtlCol="0">
-              <a:spAutoFit/>
-            </a:bodyPr>
-            <a:lstStyle/>
-            <a:p>
-              <a:r>
-                <a:rPr lang="en-AU" sz="589" dirty="0"/>
-                <a:t>iv</a:t>
-              </a:r>
-              <a:endParaRPr lang="en-AU" sz="643" dirty="0"/>
-            </a:p>
-          </p:txBody>
-        </p:sp>
-      </p:grpSp>
-      <p:pic>
-        <p:nvPicPr>
           <p:cNvPr id="14" name="Picture 13"/>
           <p:cNvPicPr>
             <a:picLocks noChangeAspect="1"/>
@@ -6114,7 +5649,7 @@
           <p:nvPr/>
         </p:nvPicPr>
         <p:blipFill>
-          <a:blip r:embed="rId14"/>
+          <a:blip r:embed="rId4"/>
           <a:stretch>
             <a:fillRect/>
           </a:stretch>
@@ -6164,7 +5699,7 @@
             <p:nvPr/>
           </p:nvPicPr>
           <p:blipFill>
-            <a:blip r:embed="rId15"/>
+            <a:blip r:embed="rId5"/>
             <a:stretch>
               <a:fillRect/>
             </a:stretch>
@@ -6224,7 +5759,7 @@
           <p:nvPr/>
         </p:nvPicPr>
         <p:blipFill>
-          <a:blip r:embed="rId16"/>
+          <a:blip r:embed="rId6"/>
           <a:stretch>
             <a:fillRect/>
           </a:stretch>
@@ -6239,53 +5774,6 @@
           </a:prstGeom>
         </p:spPr>
       </p:pic>
-      <p:sp>
-        <p:nvSpPr>
-          <p:cNvPr id="48" name="TextBox 47"/>
-          <p:cNvSpPr txBox="1"/>
-          <p:nvPr/>
-        </p:nvSpPr>
-        <p:spPr>
-          <a:xfrm>
-            <a:off x="-2302604" y="820856"/>
-            <a:ext cx="2183946" cy="4840299"/>
-          </a:xfrm>
-          <a:prstGeom prst="rect">
-            <a:avLst/>
-          </a:prstGeom>
-          <a:noFill/>
-        </p:spPr>
-        <p:txBody>
-          <a:bodyPr wrap="square" rtlCol="0">
-            <a:spAutoFit/>
-          </a:bodyPr>
-          <a:lstStyle/>
-          <a:p>
-            <a:r>
-              <a:rPr lang="en-AU" sz="964" dirty="0"/>
-              <a:t>Per leaf area trends in CC’s are essentially identical to environmental trends in leaf protein abundance – strongly driven by temp and rainfall. No strong effect of environment on proportional allocation of CC’s (although some response to irradiance), some evidence that carboxylation capacity per leaf area is increased by increasing LMA, although there is substantial variation in the total protein – LMA relationship, indicating that LMA is responding to other requirements than photosynthetic capacity.  </a:t>
-            </a:r>
-          </a:p>
-          <a:p>
-            <a:endParaRPr lang="en-AU" sz="964" dirty="0"/>
-          </a:p>
-          <a:p>
-            <a:r>
-              <a:rPr lang="en-AU" sz="964" dirty="0"/>
-              <a:t>Patterns in PS are also similar to patterns in total protein, although substantial variability is apparent in protein allocation to light harvesting capacity. Photosystem abundance does not increase on a per leaf area basis as leaves become thicker/denser, and reduces as a proportion of total leaf protein.</a:t>
-            </a:r>
-          </a:p>
-          <a:p>
-            <a:endParaRPr lang="en-AU" sz="964" dirty="0"/>
-          </a:p>
-          <a:p>
-            <a:r>
-              <a:rPr lang="en-AU" sz="964" dirty="0"/>
-              <a:t>Low per leaf area protein abundance at warm, wet sites is more closely associated with low LMA than low protein concentration, while high per leaf area protein abundance at cool, dry sites is strongly associated with high protein concentration.</a:t>
-            </a:r>
-          </a:p>
-        </p:txBody>
-      </p:sp>
       <p:cxnSp>
         <p:nvCxnSpPr>
           <p:cNvPr id="7" name="Straight Connector 6"/>
@@ -6316,6 +5804,671 @@
           </a:fontRef>
         </p:style>
       </p:cxnSp>
+      <p:grpSp>
+        <p:nvGrpSpPr>
+          <p:cNvPr id="32" name="Group 31"/>
+          <p:cNvGrpSpPr/>
+          <p:nvPr/>
+        </p:nvGrpSpPr>
+        <p:grpSpPr>
+          <a:xfrm>
+            <a:off x="1124637" y="3551278"/>
+            <a:ext cx="5095184" cy="3246518"/>
+            <a:chOff x="91676" y="8847134"/>
+            <a:chExt cx="5095184" cy="3246518"/>
+          </a:xfrm>
+        </p:grpSpPr>
+        <p:pic>
+          <p:nvPicPr>
+            <p:cNvPr id="33" name="Picture 32"/>
+            <p:cNvPicPr>
+              <a:picLocks noChangeAspect="1"/>
+            </p:cNvPicPr>
+            <p:nvPr/>
+          </p:nvPicPr>
+          <p:blipFill>
+            <a:blip r:embed="rId7" cstate="print">
+              <a:extLst>
+                <a:ext uri="{28A0092B-C50C-407E-A947-70E740481C1C}">
+                  <a14:useLocalDpi xmlns:a14="http://schemas.microsoft.com/office/drawing/2010/main" val="0"/>
+                </a:ext>
+              </a:extLst>
+            </a:blip>
+            <a:stretch>
+              <a:fillRect/>
+            </a:stretch>
+          </p:blipFill>
+          <p:spPr>
+            <a:xfrm>
+              <a:off x="91676" y="9004978"/>
+              <a:ext cx="1697164" cy="1501981"/>
+            </a:xfrm>
+            <a:prstGeom prst="rect">
+              <a:avLst/>
+            </a:prstGeom>
+          </p:spPr>
+        </p:pic>
+        <p:pic>
+          <p:nvPicPr>
+            <p:cNvPr id="34" name="Picture 33"/>
+            <p:cNvPicPr>
+              <a:picLocks noChangeAspect="1"/>
+            </p:cNvPicPr>
+            <p:nvPr/>
+          </p:nvPicPr>
+          <p:blipFill>
+            <a:blip r:embed="rId8" cstate="print">
+              <a:extLst>
+                <a:ext uri="{28A0092B-C50C-407E-A947-70E740481C1C}">
+                  <a14:useLocalDpi xmlns:a14="http://schemas.microsoft.com/office/drawing/2010/main" val="0"/>
+                </a:ext>
+              </a:extLst>
+            </a:blip>
+            <a:stretch>
+              <a:fillRect/>
+            </a:stretch>
+          </p:blipFill>
+          <p:spPr>
+            <a:xfrm>
+              <a:off x="187274" y="10565733"/>
+              <a:ext cx="1697164" cy="1501981"/>
+            </a:xfrm>
+            <a:prstGeom prst="rect">
+              <a:avLst/>
+            </a:prstGeom>
+          </p:spPr>
+        </p:pic>
+        <p:pic>
+          <p:nvPicPr>
+            <p:cNvPr id="35" name="Picture 34"/>
+            <p:cNvPicPr>
+              <a:picLocks noChangeAspect="1"/>
+            </p:cNvPicPr>
+            <p:nvPr/>
+          </p:nvPicPr>
+          <p:blipFill>
+            <a:blip r:embed="rId9" cstate="print">
+              <a:extLst>
+                <a:ext uri="{28A0092B-C50C-407E-A947-70E740481C1C}">
+                  <a14:useLocalDpi xmlns:a14="http://schemas.microsoft.com/office/drawing/2010/main" val="0"/>
+                </a:ext>
+              </a:extLst>
+            </a:blip>
+            <a:stretch>
+              <a:fillRect/>
+            </a:stretch>
+          </p:blipFill>
+          <p:spPr>
+            <a:xfrm>
+              <a:off x="1772492" y="9004978"/>
+              <a:ext cx="1697164" cy="1501981"/>
+            </a:xfrm>
+            <a:prstGeom prst="rect">
+              <a:avLst/>
+            </a:prstGeom>
+          </p:spPr>
+        </p:pic>
+        <p:pic>
+          <p:nvPicPr>
+            <p:cNvPr id="36" name="Picture 35"/>
+            <p:cNvPicPr>
+              <a:picLocks noChangeAspect="1"/>
+            </p:cNvPicPr>
+            <p:nvPr/>
+          </p:nvPicPr>
+          <p:blipFill>
+            <a:blip r:embed="rId10" cstate="print">
+              <a:extLst>
+                <a:ext uri="{28A0092B-C50C-407E-A947-70E740481C1C}">
+                  <a14:useLocalDpi xmlns:a14="http://schemas.microsoft.com/office/drawing/2010/main" val="0"/>
+                </a:ext>
+              </a:extLst>
+            </a:blip>
+            <a:stretch>
+              <a:fillRect/>
+            </a:stretch>
+          </p:blipFill>
+          <p:spPr>
+            <a:xfrm>
+              <a:off x="1868090" y="10565328"/>
+              <a:ext cx="1697164" cy="1501981"/>
+            </a:xfrm>
+            <a:prstGeom prst="rect">
+              <a:avLst/>
+            </a:prstGeom>
+          </p:spPr>
+        </p:pic>
+        <p:pic>
+          <p:nvPicPr>
+            <p:cNvPr id="37" name="Picture 36"/>
+            <p:cNvPicPr>
+              <a:picLocks noChangeAspect="1"/>
+            </p:cNvPicPr>
+            <p:nvPr/>
+          </p:nvPicPr>
+          <p:blipFill>
+            <a:blip r:embed="rId11" cstate="print">
+              <a:extLst>
+                <a:ext uri="{28A0092B-C50C-407E-A947-70E740481C1C}">
+                  <a14:useLocalDpi xmlns:a14="http://schemas.microsoft.com/office/drawing/2010/main" val="0"/>
+                </a:ext>
+              </a:extLst>
+            </a:blip>
+            <a:stretch>
+              <a:fillRect/>
+            </a:stretch>
+          </p:blipFill>
+          <p:spPr>
+            <a:xfrm>
+              <a:off x="3418162" y="9004572"/>
+              <a:ext cx="1697164" cy="1501981"/>
+            </a:xfrm>
+            <a:prstGeom prst="rect">
+              <a:avLst/>
+            </a:prstGeom>
+          </p:spPr>
+        </p:pic>
+        <p:pic>
+          <p:nvPicPr>
+            <p:cNvPr id="38" name="Picture 37"/>
+            <p:cNvPicPr>
+              <a:picLocks noChangeAspect="1"/>
+            </p:cNvPicPr>
+            <p:nvPr/>
+          </p:nvPicPr>
+          <p:blipFill>
+            <a:blip r:embed="rId12" cstate="print">
+              <a:extLst>
+                <a:ext uri="{28A0092B-C50C-407E-A947-70E740481C1C}">
+                  <a14:useLocalDpi xmlns:a14="http://schemas.microsoft.com/office/drawing/2010/main" val="0"/>
+                </a:ext>
+              </a:extLst>
+            </a:blip>
+            <a:stretch>
+              <a:fillRect/>
+            </a:stretch>
+          </p:blipFill>
+          <p:spPr>
+            <a:xfrm>
+              <a:off x="3489696" y="10591671"/>
+              <a:ext cx="1697164" cy="1501981"/>
+            </a:xfrm>
+            <a:prstGeom prst="rect">
+              <a:avLst/>
+            </a:prstGeom>
+          </p:spPr>
+        </p:pic>
+        <p:sp>
+          <p:nvSpPr>
+            <p:cNvPr id="40" name="TextBox 39"/>
+            <p:cNvSpPr txBox="1"/>
+            <p:nvPr/>
+          </p:nvSpPr>
+          <p:spPr>
+            <a:xfrm>
+              <a:off x="311684" y="8847134"/>
+              <a:ext cx="133475" cy="261610"/>
+            </a:xfrm>
+            <a:prstGeom prst="rect">
+              <a:avLst/>
+            </a:prstGeom>
+            <a:noFill/>
+          </p:spPr>
+          <p:txBody>
+            <a:bodyPr wrap="square" rtlCol="0">
+              <a:spAutoFit/>
+            </a:bodyPr>
+            <a:lstStyle/>
+            <a:p>
+              <a:r>
+                <a:rPr lang="en-AU" sz="1100" dirty="0" err="1"/>
+                <a:t>i</a:t>
+              </a:r>
+              <a:endParaRPr lang="en-AU" sz="1200" dirty="0"/>
+            </a:p>
+          </p:txBody>
+        </p:sp>
+        <p:sp>
+          <p:nvSpPr>
+            <p:cNvPr id="41" name="TextBox 40"/>
+            <p:cNvSpPr txBox="1"/>
+            <p:nvPr/>
+          </p:nvSpPr>
+          <p:spPr>
+            <a:xfrm>
+              <a:off x="2017933" y="8847134"/>
+              <a:ext cx="467155" cy="261610"/>
+            </a:xfrm>
+            <a:prstGeom prst="rect">
+              <a:avLst/>
+            </a:prstGeom>
+            <a:noFill/>
+          </p:spPr>
+          <p:txBody>
+            <a:bodyPr wrap="square" rtlCol="0">
+              <a:spAutoFit/>
+            </a:bodyPr>
+            <a:lstStyle/>
+            <a:p>
+              <a:r>
+                <a:rPr lang="en-AU" sz="1100" dirty="0" smtClean="0"/>
+                <a:t>iii</a:t>
+              </a:r>
+              <a:endParaRPr lang="en-AU" sz="1200" dirty="0"/>
+            </a:p>
+          </p:txBody>
+        </p:sp>
+        <p:sp>
+          <p:nvSpPr>
+            <p:cNvPr id="42" name="TextBox 41"/>
+            <p:cNvSpPr txBox="1"/>
+            <p:nvPr/>
+          </p:nvSpPr>
+          <p:spPr>
+            <a:xfrm>
+              <a:off x="3689749" y="8847134"/>
+              <a:ext cx="368113" cy="261610"/>
+            </a:xfrm>
+            <a:prstGeom prst="rect">
+              <a:avLst/>
+            </a:prstGeom>
+            <a:noFill/>
+          </p:spPr>
+          <p:txBody>
+            <a:bodyPr wrap="square" rtlCol="0">
+              <a:spAutoFit/>
+            </a:bodyPr>
+            <a:lstStyle/>
+            <a:p>
+              <a:r>
+                <a:rPr lang="en-AU" sz="1100" dirty="0" smtClean="0"/>
+                <a:t>v</a:t>
+              </a:r>
+              <a:endParaRPr lang="en-AU" sz="1200" dirty="0"/>
+            </a:p>
+          </p:txBody>
+        </p:sp>
+        <p:sp>
+          <p:nvSpPr>
+            <p:cNvPr id="43" name="TextBox 42"/>
+            <p:cNvSpPr txBox="1"/>
+            <p:nvPr/>
+          </p:nvSpPr>
+          <p:spPr>
+            <a:xfrm>
+              <a:off x="285154" y="10360287"/>
+              <a:ext cx="277811" cy="261610"/>
+            </a:xfrm>
+            <a:prstGeom prst="rect">
+              <a:avLst/>
+            </a:prstGeom>
+            <a:noFill/>
+          </p:spPr>
+          <p:txBody>
+            <a:bodyPr wrap="square" rtlCol="0">
+              <a:spAutoFit/>
+            </a:bodyPr>
+            <a:lstStyle/>
+            <a:p>
+              <a:r>
+                <a:rPr lang="en-AU" sz="1100" dirty="0" smtClean="0"/>
+                <a:t>ii</a:t>
+              </a:r>
+              <a:endParaRPr lang="en-AU" sz="1200" dirty="0"/>
+            </a:p>
+          </p:txBody>
+        </p:sp>
+        <p:sp>
+          <p:nvSpPr>
+            <p:cNvPr id="44" name="TextBox 43"/>
+            <p:cNvSpPr txBox="1"/>
+            <p:nvPr/>
+          </p:nvSpPr>
+          <p:spPr>
+            <a:xfrm>
+              <a:off x="1958701" y="10360287"/>
+              <a:ext cx="325521" cy="261610"/>
+            </a:xfrm>
+            <a:prstGeom prst="rect">
+              <a:avLst/>
+            </a:prstGeom>
+            <a:noFill/>
+          </p:spPr>
+          <p:txBody>
+            <a:bodyPr wrap="square" rtlCol="0">
+              <a:spAutoFit/>
+            </a:bodyPr>
+            <a:lstStyle/>
+            <a:p>
+              <a:r>
+                <a:rPr lang="en-AU" sz="1100" dirty="0" smtClean="0"/>
+                <a:t>iv</a:t>
+              </a:r>
+              <a:endParaRPr lang="en-AU" sz="1200" dirty="0"/>
+            </a:p>
+          </p:txBody>
+        </p:sp>
+        <p:sp>
+          <p:nvSpPr>
+            <p:cNvPr id="45" name="TextBox 44"/>
+            <p:cNvSpPr txBox="1"/>
+            <p:nvPr/>
+          </p:nvSpPr>
+          <p:spPr>
+            <a:xfrm>
+              <a:off x="3656959" y="10360287"/>
+              <a:ext cx="300810" cy="261610"/>
+            </a:xfrm>
+            <a:prstGeom prst="rect">
+              <a:avLst/>
+            </a:prstGeom>
+            <a:noFill/>
+          </p:spPr>
+          <p:txBody>
+            <a:bodyPr wrap="square" rtlCol="0">
+              <a:spAutoFit/>
+            </a:bodyPr>
+            <a:lstStyle/>
+            <a:p>
+              <a:r>
+                <a:rPr lang="en-AU" sz="1100" dirty="0" smtClean="0"/>
+                <a:t>vi</a:t>
+              </a:r>
+              <a:endParaRPr lang="en-AU" sz="1200" dirty="0"/>
+            </a:p>
+          </p:txBody>
+        </p:sp>
+      </p:grpSp>
+      <p:grpSp>
+        <p:nvGrpSpPr>
+          <p:cNvPr id="46" name="Group 45"/>
+          <p:cNvGrpSpPr/>
+          <p:nvPr/>
+        </p:nvGrpSpPr>
+        <p:grpSpPr>
+          <a:xfrm>
+            <a:off x="6747429" y="3521570"/>
+            <a:ext cx="3483131" cy="3378254"/>
+            <a:chOff x="5984306" y="7028745"/>
+            <a:chExt cx="3483131" cy="3378254"/>
+          </a:xfrm>
+        </p:grpSpPr>
+        <p:sp>
+          <p:nvSpPr>
+            <p:cNvPr id="47" name="TextBox 46">
+              <a:extLst>
+                <a:ext uri="{FF2B5EF4-FFF2-40B4-BE49-F238E27FC236}">
+                  <a16:creationId xmlns:a16="http://schemas.microsoft.com/office/drawing/2014/main" id="{036694F8-822A-4EA9-A83F-BB11CF14A3AC}"/>
+                </a:ext>
+              </a:extLst>
+            </p:cNvPr>
+            <p:cNvSpPr txBox="1"/>
+            <p:nvPr/>
+          </p:nvSpPr>
+          <p:spPr>
+            <a:xfrm>
+              <a:off x="5984306" y="7028745"/>
+              <a:ext cx="205508" cy="276999"/>
+            </a:xfrm>
+            <a:prstGeom prst="rect">
+              <a:avLst/>
+            </a:prstGeom>
+            <a:noFill/>
+          </p:spPr>
+          <p:txBody>
+            <a:bodyPr wrap="square" rtlCol="0">
+              <a:spAutoFit/>
+            </a:bodyPr>
+            <a:lstStyle/>
+            <a:p>
+              <a:r>
+                <a:rPr lang="en-AU" sz="1200" dirty="0"/>
+                <a:t>c</a:t>
+              </a:r>
+            </a:p>
+          </p:txBody>
+        </p:sp>
+        <p:pic>
+          <p:nvPicPr>
+            <p:cNvPr id="49" name="Picture 48"/>
+            <p:cNvPicPr>
+              <a:picLocks noChangeAspect="1"/>
+            </p:cNvPicPr>
+            <p:nvPr/>
+          </p:nvPicPr>
+          <p:blipFill>
+            <a:blip r:embed="rId13" cstate="print">
+              <a:extLst>
+                <a:ext uri="{28A0092B-C50C-407E-A947-70E740481C1C}">
+                  <a14:useLocalDpi xmlns:a14="http://schemas.microsoft.com/office/drawing/2010/main" val="0"/>
+                </a:ext>
+              </a:extLst>
+            </a:blip>
+            <a:stretch>
+              <a:fillRect/>
+            </a:stretch>
+          </p:blipFill>
+          <p:spPr>
+            <a:xfrm>
+              <a:off x="7770273" y="7267005"/>
+              <a:ext cx="1697164" cy="1501981"/>
+            </a:xfrm>
+            <a:prstGeom prst="rect">
+              <a:avLst/>
+            </a:prstGeom>
+          </p:spPr>
+        </p:pic>
+        <p:pic>
+          <p:nvPicPr>
+            <p:cNvPr id="50" name="Picture 49"/>
+            <p:cNvPicPr>
+              <a:picLocks noChangeAspect="1"/>
+            </p:cNvPicPr>
+            <p:nvPr/>
+          </p:nvPicPr>
+          <p:blipFill>
+            <a:blip r:embed="rId14" cstate="print">
+              <a:extLst>
+                <a:ext uri="{28A0092B-C50C-407E-A947-70E740481C1C}">
+                  <a14:useLocalDpi xmlns:a14="http://schemas.microsoft.com/office/drawing/2010/main" val="0"/>
+                </a:ext>
+              </a:extLst>
+            </a:blip>
+            <a:stretch>
+              <a:fillRect/>
+            </a:stretch>
+          </p:blipFill>
+          <p:spPr>
+            <a:xfrm>
+              <a:off x="7766719" y="8905018"/>
+              <a:ext cx="1697164" cy="1501981"/>
+            </a:xfrm>
+            <a:prstGeom prst="rect">
+              <a:avLst/>
+            </a:prstGeom>
+          </p:spPr>
+        </p:pic>
+        <p:pic>
+          <p:nvPicPr>
+            <p:cNvPr id="51" name="Picture 50"/>
+            <p:cNvPicPr>
+              <a:picLocks noChangeAspect="1"/>
+            </p:cNvPicPr>
+            <p:nvPr/>
+          </p:nvPicPr>
+          <p:blipFill>
+            <a:blip r:embed="rId15" cstate="print">
+              <a:extLst>
+                <a:ext uri="{28A0092B-C50C-407E-A947-70E740481C1C}">
+                  <a14:useLocalDpi xmlns:a14="http://schemas.microsoft.com/office/drawing/2010/main" val="0"/>
+                </a:ext>
+              </a:extLst>
+            </a:blip>
+            <a:stretch>
+              <a:fillRect/>
+            </a:stretch>
+          </p:blipFill>
+          <p:spPr>
+            <a:xfrm>
+              <a:off x="6038823" y="7267443"/>
+              <a:ext cx="1697164" cy="1501981"/>
+            </a:xfrm>
+            <a:prstGeom prst="rect">
+              <a:avLst/>
+            </a:prstGeom>
+          </p:spPr>
+        </p:pic>
+        <p:pic>
+          <p:nvPicPr>
+            <p:cNvPr id="52" name="Picture 51"/>
+            <p:cNvPicPr>
+              <a:picLocks noChangeAspect="1"/>
+            </p:cNvPicPr>
+            <p:nvPr/>
+          </p:nvPicPr>
+          <p:blipFill>
+            <a:blip r:embed="rId16" cstate="print">
+              <a:extLst>
+                <a:ext uri="{28A0092B-C50C-407E-A947-70E740481C1C}">
+                  <a14:useLocalDpi xmlns:a14="http://schemas.microsoft.com/office/drawing/2010/main" val="0"/>
+                </a:ext>
+              </a:extLst>
+            </a:blip>
+            <a:stretch>
+              <a:fillRect/>
+            </a:stretch>
+          </p:blipFill>
+          <p:spPr>
+            <a:xfrm>
+              <a:off x="6069555" y="8860668"/>
+              <a:ext cx="1697164" cy="1501981"/>
+            </a:xfrm>
+            <a:prstGeom prst="rect">
+              <a:avLst/>
+            </a:prstGeom>
+          </p:spPr>
+        </p:pic>
+        <p:sp>
+          <p:nvSpPr>
+            <p:cNvPr id="53" name="TextBox 52"/>
+            <p:cNvSpPr txBox="1"/>
+            <p:nvPr/>
+          </p:nvSpPr>
+          <p:spPr>
+            <a:xfrm>
+              <a:off x="6235958" y="7227369"/>
+              <a:ext cx="133475" cy="261610"/>
+            </a:xfrm>
+            <a:prstGeom prst="rect">
+              <a:avLst/>
+            </a:prstGeom>
+            <a:noFill/>
+          </p:spPr>
+          <p:txBody>
+            <a:bodyPr wrap="square" rtlCol="0">
+              <a:spAutoFit/>
+            </a:bodyPr>
+            <a:lstStyle/>
+            <a:p>
+              <a:r>
+                <a:rPr lang="en-AU" sz="1100" dirty="0" err="1"/>
+                <a:t>i</a:t>
+              </a:r>
+              <a:endParaRPr lang="en-AU" sz="1200" dirty="0"/>
+            </a:p>
+          </p:txBody>
+        </p:sp>
+        <p:sp>
+          <p:nvSpPr>
+            <p:cNvPr id="54" name="TextBox 53"/>
+            <p:cNvSpPr txBox="1"/>
+            <p:nvPr/>
+          </p:nvSpPr>
+          <p:spPr>
+            <a:xfrm>
+              <a:off x="7933122" y="7240985"/>
+              <a:ext cx="368289" cy="261610"/>
+            </a:xfrm>
+            <a:prstGeom prst="rect">
+              <a:avLst/>
+            </a:prstGeom>
+            <a:noFill/>
+          </p:spPr>
+          <p:txBody>
+            <a:bodyPr wrap="square" rtlCol="0">
+              <a:spAutoFit/>
+            </a:bodyPr>
+            <a:lstStyle/>
+            <a:p>
+              <a:r>
+                <a:rPr lang="en-AU" sz="1100" dirty="0" smtClean="0"/>
+                <a:t>iii</a:t>
+              </a:r>
+              <a:endParaRPr lang="en-AU" sz="1200" dirty="0"/>
+            </a:p>
+          </p:txBody>
+        </p:sp>
+        <p:sp>
+          <p:nvSpPr>
+            <p:cNvPr id="65" name="TextBox 64"/>
+            <p:cNvSpPr txBox="1"/>
+            <p:nvPr/>
+          </p:nvSpPr>
+          <p:spPr>
+            <a:xfrm>
+              <a:off x="6206654" y="8606880"/>
+              <a:ext cx="322748" cy="261610"/>
+            </a:xfrm>
+            <a:prstGeom prst="rect">
+              <a:avLst/>
+            </a:prstGeom>
+            <a:noFill/>
+          </p:spPr>
+          <p:txBody>
+            <a:bodyPr wrap="square" rtlCol="0">
+              <a:spAutoFit/>
+            </a:bodyPr>
+            <a:lstStyle/>
+            <a:p>
+              <a:r>
+                <a:rPr lang="en-AU" sz="1100" dirty="0" smtClean="0"/>
+                <a:t>ii</a:t>
+              </a:r>
+              <a:endParaRPr lang="en-AU" sz="1200" dirty="0"/>
+            </a:p>
+          </p:txBody>
+        </p:sp>
+        <p:sp>
+          <p:nvSpPr>
+            <p:cNvPr id="66" name="TextBox 65"/>
+            <p:cNvSpPr txBox="1"/>
+            <p:nvPr/>
+          </p:nvSpPr>
+          <p:spPr>
+            <a:xfrm>
+              <a:off x="7933122" y="8638052"/>
+              <a:ext cx="293444" cy="261610"/>
+            </a:xfrm>
+            <a:prstGeom prst="rect">
+              <a:avLst/>
+            </a:prstGeom>
+            <a:noFill/>
+          </p:spPr>
+          <p:txBody>
+            <a:bodyPr wrap="square" rtlCol="0">
+              <a:spAutoFit/>
+            </a:bodyPr>
+            <a:lstStyle/>
+            <a:p>
+              <a:r>
+                <a:rPr lang="en-AU" sz="1100" dirty="0" smtClean="0"/>
+                <a:t>iv</a:t>
+              </a:r>
+              <a:endParaRPr lang="en-AU" sz="1200" dirty="0"/>
+            </a:p>
+          </p:txBody>
+        </p:sp>
+      </p:grpSp>
     </p:spTree>
     <p:extLst>
       <p:ext uri="{BB962C8B-B14F-4D97-AF65-F5344CB8AC3E}">

</xml_diff>